<commit_message>
Upload a revised presentation
</commit_message>
<xml_diff>
--- a/Backlog.pptx
+++ b/Backlog.pptx
@@ -5,12 +5,12 @@
     <p:sldMasterId id="2147483732" r:id="rId1"/>
   </p:sldMasterIdLst>
   <p:notesMasterIdLst>
-    <p:notesMasterId r:id="rId25"/>
+    <p:notesMasterId r:id="rId26"/>
   </p:notesMasterIdLst>
   <p:sldIdLst>
     <p:sldId id="256" r:id="rId2"/>
-    <p:sldId id="257" r:id="rId3"/>
-    <p:sldId id="286" r:id="rId4"/>
+    <p:sldId id="286" r:id="rId3"/>
+    <p:sldId id="257" r:id="rId4"/>
     <p:sldId id="274" r:id="rId5"/>
     <p:sldId id="287" r:id="rId6"/>
     <p:sldId id="292" r:id="rId7"/>
@@ -24,13 +24,14 @@
     <p:sldId id="293" r:id="rId15"/>
     <p:sldId id="303" r:id="rId16"/>
     <p:sldId id="304" r:id="rId17"/>
-    <p:sldId id="305" r:id="rId18"/>
-    <p:sldId id="307" r:id="rId19"/>
-    <p:sldId id="309" r:id="rId20"/>
-    <p:sldId id="308" r:id="rId21"/>
-    <p:sldId id="310" r:id="rId22"/>
-    <p:sldId id="311" r:id="rId23"/>
-    <p:sldId id="313" r:id="rId24"/>
+    <p:sldId id="314" r:id="rId18"/>
+    <p:sldId id="305" r:id="rId19"/>
+    <p:sldId id="307" r:id="rId20"/>
+    <p:sldId id="309" r:id="rId21"/>
+    <p:sldId id="308" r:id="rId22"/>
+    <p:sldId id="310" r:id="rId23"/>
+    <p:sldId id="311" r:id="rId24"/>
+    <p:sldId id="313" r:id="rId25"/>
   </p:sldIdLst>
   <p:sldSz cx="12192000" cy="6858000"/>
   <p:notesSz cx="6858000" cy="9144000"/>
@@ -219,7 +220,7 @@
           <a:p>
             <a:fld id="{19BA28D3-546A-4B77-84A4-31AB33EEC16B}" type="datetimeFigureOut">
               <a:rPr lang="he-IL" smtClean="0"/>
-              <a:t>י'/כסלו/תשע"ט</a:t>
+              <a:t>י"א/כסלו/תשע"ט</a:t>
             </a:fld>
             <a:endParaRPr lang="he-IL"/>
           </a:p>
@@ -644,7 +645,7 @@
           <a:p>
             <a:fld id="{792AAFAA-7B78-43EF-9E3E-042257DFB35B}" type="datetime1">
               <a:rPr lang="en-US" smtClean="0"/>
-              <a:t>11/18/2018</a:t>
+              <a:t>11/19/2018</a:t>
             </a:fld>
             <a:endParaRPr lang="en-US" dirty="0"/>
           </a:p>
@@ -944,7 +945,7 @@
           <a:p>
             <a:fld id="{4FFF340C-6B71-4FA1-ADED-3889D4EFE6E9}" type="datetime1">
               <a:rPr lang="en-US" smtClean="0"/>
-              <a:t>11/18/2018</a:t>
+              <a:t>11/19/2018</a:t>
             </a:fld>
             <a:endParaRPr lang="en-US" dirty="0"/>
           </a:p>
@@ -1151,7 +1152,7 @@
           <a:p>
             <a:fld id="{3132C541-71AF-4A8E-8CC1-1BC11259679C}" type="datetime1">
               <a:rPr lang="en-US" smtClean="0"/>
-              <a:t>11/18/2018</a:t>
+              <a:t>11/19/2018</a:t>
             </a:fld>
             <a:endParaRPr lang="en-US" dirty="0"/>
           </a:p>
@@ -1432,7 +1433,7 @@
           <a:p>
             <a:fld id="{79E3794A-F0C0-4AFD-90C4-76BCEF52E835}" type="datetime1">
               <a:rPr lang="en-US" smtClean="0"/>
-              <a:t>11/18/2018</a:t>
+              <a:t>11/19/2018</a:t>
             </a:fld>
             <a:endParaRPr lang="en-US" dirty="0"/>
           </a:p>
@@ -1777,7 +1778,7 @@
           <a:p>
             <a:fld id="{890EE26B-BB39-45D3-A150-7A22CBAEA2DC}" type="datetime1">
               <a:rPr lang="en-US" smtClean="0"/>
-              <a:t>11/18/2018</a:t>
+              <a:t>11/19/2018</a:t>
             </a:fld>
             <a:endParaRPr lang="en-US" dirty="0"/>
           </a:p>
@@ -2400,7 +2401,7 @@
           <a:p>
             <a:fld id="{7C7B9E8F-0BB3-41B5-A60B-014F046C67C4}" type="datetime1">
               <a:rPr lang="en-US" smtClean="0"/>
-              <a:t>11/18/2018</a:t>
+              <a:t>11/19/2018</a:t>
             </a:fld>
             <a:endParaRPr lang="en-US" dirty="0"/>
           </a:p>
@@ -3260,7 +3261,7 @@
           <a:p>
             <a:fld id="{F9021199-CDD1-440A-B974-4A18C49EF84B}" type="datetime1">
               <a:rPr lang="en-US" smtClean="0"/>
-              <a:t>11/18/2018</a:t>
+              <a:t>11/19/2018</a:t>
             </a:fld>
             <a:endParaRPr lang="en-US" dirty="0"/>
           </a:p>
@@ -3443,7 +3444,7 @@
           <a:p>
             <a:fld id="{4F5EEA7D-CE3D-4A8B-B5D9-6CA4AB43A3C9}" type="datetime1">
               <a:rPr lang="en-US" smtClean="0"/>
-              <a:t>11/18/2018</a:t>
+              <a:t>11/19/2018</a:t>
             </a:fld>
             <a:endParaRPr lang="en-US" dirty="0"/>
           </a:p>
@@ -3635,7 +3636,7 @@
           <a:p>
             <a:fld id="{A5F17F34-BC0C-4552-871A-120DCF537639}" type="datetime1">
               <a:rPr lang="en-US" smtClean="0"/>
-              <a:t>11/18/2018</a:t>
+              <a:t>11/19/2018</a:t>
             </a:fld>
             <a:endParaRPr lang="en-US" dirty="0"/>
           </a:p>
@@ -3817,7 +3818,7 @@
           <a:p>
             <a:fld id="{5FF9D923-C86B-4863-AD77-34FC78976372}" type="datetime1">
               <a:rPr lang="en-US" smtClean="0"/>
-              <a:t>11/18/2018</a:t>
+              <a:t>11/19/2018</a:t>
             </a:fld>
             <a:endParaRPr lang="en-US" dirty="0"/>
           </a:p>
@@ -4073,7 +4074,7 @@
           <a:p>
             <a:fld id="{EA382D88-AE59-4CBE-BB26-17F91E555001}" type="datetime1">
               <a:rPr lang="en-US" smtClean="0"/>
-              <a:t>11/18/2018</a:t>
+              <a:t>11/19/2018</a:t>
             </a:fld>
             <a:endParaRPr lang="en-US" dirty="0"/>
           </a:p>
@@ -4377,7 +4378,7 @@
           <a:p>
             <a:fld id="{0BF04825-F3AD-4AE8-A979-DB441EDDC1E4}" type="datetime1">
               <a:rPr lang="en-US" smtClean="0"/>
-              <a:t>11/18/2018</a:t>
+              <a:t>11/19/2018</a:t>
             </a:fld>
             <a:endParaRPr lang="en-US" dirty="0"/>
           </a:p>
@@ -4827,7 +4828,7 @@
           <a:p>
             <a:fld id="{7E812CBE-DBD8-4CCE-A480-5C35A5626084}" type="datetime1">
               <a:rPr lang="en-US" smtClean="0"/>
-              <a:t>11/18/2018</a:t>
+              <a:t>11/19/2018</a:t>
             </a:fld>
             <a:endParaRPr lang="en-US" dirty="0"/>
           </a:p>
@@ -4957,7 +4958,7 @@
           <a:p>
             <a:fld id="{C7FBD888-97E8-4FAA-B4A2-126A00CB9898}" type="datetime1">
               <a:rPr lang="en-US" smtClean="0"/>
-              <a:t>11/18/2018</a:t>
+              <a:t>11/19/2018</a:t>
             </a:fld>
             <a:endParaRPr lang="en-US" dirty="0"/>
           </a:p>
@@ -5064,7 +5065,7 @@
           <a:p>
             <a:fld id="{3BF117DC-E28F-4010-9A6D-C643EF6D6817}" type="datetime1">
               <a:rPr lang="en-US" smtClean="0"/>
-              <a:t>11/18/2018</a:t>
+              <a:t>11/19/2018</a:t>
             </a:fld>
             <a:endParaRPr lang="en-US" dirty="0"/>
           </a:p>
@@ -5355,7 +5356,7 @@
           <a:p>
             <a:fld id="{2A80FA70-EF47-455B-A14D-85546722D335}" type="datetime1">
               <a:rPr lang="en-US" smtClean="0"/>
-              <a:t>11/18/2018</a:t>
+              <a:t>11/19/2018</a:t>
             </a:fld>
             <a:endParaRPr lang="en-US" dirty="0"/>
           </a:p>
@@ -5642,7 +5643,7 @@
           <a:p>
             <a:fld id="{E0B80E97-60F2-4293-9B79-A4178ED1CAC2}" type="datetime1">
               <a:rPr lang="en-US" smtClean="0"/>
-              <a:t>11/18/2018</a:t>
+              <a:t>11/19/2018</a:t>
             </a:fld>
             <a:endParaRPr lang="en-US" dirty="0"/>
           </a:p>
@@ -6083,7 +6084,7 @@
           <a:p>
             <a:fld id="{1B002E81-550A-42DF-8C9B-257CC61FBBA3}" type="datetime1">
               <a:rPr lang="en-US" smtClean="0"/>
-              <a:t>11/18/2018</a:t>
+              <a:t>11/19/2018</a:t>
             </a:fld>
             <a:endParaRPr lang="en-US" dirty="0"/>
           </a:p>
@@ -7166,12 +7167,12 @@
           <a:p>
             <a:pPr algn="ctr"/>
             <a:r>
-              <a:rPr lang="en-US" dirty="0">
+              <a:rPr lang="en-US" sz="3600" dirty="0">
                 <a:solidFill>
                   <a:schemeClr val="tx1"/>
                 </a:solidFill>
               </a:rPr>
-              <a:t>Page of groups that the user manages</a:t>
+              <a:t>Page of groups that the Employer manages</a:t>
             </a:r>
           </a:p>
         </p:txBody>
@@ -7228,7 +7229,7 @@
         </p:blipFill>
         <p:spPr>
           <a:xfrm>
-            <a:off x="1210827" y="525514"/>
+            <a:off x="1364013" y="497806"/>
             <a:ext cx="560886" cy="560886"/>
           </a:xfrm>
           <a:prstGeom prst="rect">
@@ -7468,7 +7469,7 @@
             </a:pPr>
             <a:r>
               <a:rPr lang="en-US" sz="2800" dirty="0"/>
-              <a:t>Description: A splash screen is a graphical control element consisting of a window containing an image, a logo, and the current version of the software. A splash screen usually appears while a game or program is launching.</a:t>
+              <a:t>A convenient display of the groups which managed by the Employer.</a:t>
             </a:r>
           </a:p>
           <a:p>
@@ -7476,10 +7477,21 @@
               <a:buFont typeface="Wingdings" panose="05000000000000000000" pitchFamily="2" charset="2"/>
               <a:buChar char="§"/>
             </a:pPr>
-            <a:r>
-              <a:rPr lang="en-US" sz="2800" dirty="0"/>
-              <a:t>Splash screens are typically used by applications to notify the user that the program is in the process of loading.</a:t>
-            </a:r>
+            <a:endParaRPr lang="en-US" sz="2800" dirty="0"/>
+          </a:p>
+          <a:p>
+            <a:pPr algn="l" rtl="0">
+              <a:buFont typeface="Wingdings" panose="05000000000000000000" pitchFamily="2" charset="2"/>
+              <a:buChar char="§"/>
+            </a:pPr>
+            <a:endParaRPr lang="en-US" sz="2800" dirty="0"/>
+          </a:p>
+          <a:p>
+            <a:pPr algn="l" rtl="0">
+              <a:buFont typeface="Wingdings" panose="05000000000000000000" pitchFamily="2" charset="2"/>
+              <a:buChar char="§"/>
+            </a:pPr>
+            <a:endParaRPr lang="en-US" sz="2800" dirty="0"/>
           </a:p>
           <a:p>
             <a:pPr algn="l" rtl="0"/>
@@ -7532,7 +7544,7 @@
         </p:blipFill>
         <p:spPr>
           <a:xfrm>
-            <a:off x="3238866" y="5523238"/>
+            <a:off x="3238866" y="5350713"/>
             <a:ext cx="325148" cy="325148"/>
           </a:xfrm>
           <a:prstGeom prst="rect">
@@ -7562,7 +7574,7 @@
         </p:blipFill>
         <p:spPr>
           <a:xfrm>
-            <a:off x="2909301" y="5328561"/>
+            <a:off x="2909301" y="5147407"/>
             <a:ext cx="6588000" cy="19764"/>
           </a:xfrm>
           <a:prstGeom prst="rect">
@@ -7775,7 +7787,7 @@
         </p:blipFill>
         <p:spPr>
           <a:xfrm>
-            <a:off x="3352555" y="5903555"/>
+            <a:off x="3352555" y="5756908"/>
             <a:ext cx="629948" cy="629948"/>
           </a:xfrm>
           <a:prstGeom prst="rect">
@@ -7964,12 +7976,12 @@
           <a:p>
             <a:pPr algn="ctr"/>
             <a:r>
-              <a:rPr lang="en-US" sz="3600" dirty="0">
+              <a:rPr lang="en-US" sz="3200" dirty="0">
                 <a:solidFill>
                   <a:schemeClr val="tx1"/>
                 </a:solidFill>
               </a:rPr>
-              <a:t>Page of groups that the user is a member of</a:t>
+              <a:t>Page of groups that the Employee is a member of</a:t>
             </a:r>
           </a:p>
         </p:txBody>
@@ -8026,7 +8038,7 @@
         </p:blipFill>
         <p:spPr>
           <a:xfrm>
-            <a:off x="1210827" y="525514"/>
+            <a:off x="1229299" y="516278"/>
             <a:ext cx="560886" cy="560886"/>
           </a:xfrm>
           <a:prstGeom prst="rect">
@@ -8266,7 +8278,7 @@
             </a:pPr>
             <a:r>
               <a:rPr lang="en-US" sz="2800" dirty="0"/>
-              <a:t>Description: A splash screen is a graphical control element consisting of a window containing an image, a logo, and the current version of the software. A splash screen usually appears while a game or program is launching.</a:t>
+              <a:t>A convenient display of the groups which the Employee is a member of</a:t>
             </a:r>
           </a:p>
           <a:p>
@@ -8274,13 +8286,25 @@
               <a:buFont typeface="Wingdings" panose="05000000000000000000" pitchFamily="2" charset="2"/>
               <a:buChar char="§"/>
             </a:pPr>
-            <a:r>
-              <a:rPr lang="en-US" sz="2800" dirty="0"/>
-              <a:t>Splash screens are typically used by applications to notify the user that the program is in the process of loading.</a:t>
-            </a:r>
-          </a:p>
-          <a:p>
-            <a:pPr algn="l" rtl="0"/>
+            <a:endParaRPr lang="en-US" sz="2800" dirty="0"/>
+          </a:p>
+          <a:p>
+            <a:pPr algn="l" rtl="0">
+              <a:buFont typeface="Wingdings" panose="05000000000000000000" pitchFamily="2" charset="2"/>
+              <a:buChar char="§"/>
+            </a:pPr>
+            <a:endParaRPr lang="en-US" sz="2800" dirty="0"/>
+          </a:p>
+          <a:p>
+            <a:pPr marL="0" indent="0" algn="l" rtl="0">
+              <a:buNone/>
+            </a:pPr>
+            <a:endParaRPr lang="en-US" sz="2800" dirty="0"/>
+          </a:p>
+          <a:p>
+            <a:pPr marL="0" indent="0" algn="l" rtl="0">
+              <a:buNone/>
+            </a:pPr>
             <a:endParaRPr lang="en-US" sz="2800" dirty="0"/>
           </a:p>
           <a:p>
@@ -8330,7 +8354,7 @@
         </p:blipFill>
         <p:spPr>
           <a:xfrm>
-            <a:off x="3238866" y="5523238"/>
+            <a:off x="3238866" y="5385217"/>
             <a:ext cx="325148" cy="325148"/>
           </a:xfrm>
           <a:prstGeom prst="rect">
@@ -8360,7 +8384,7 @@
         </p:blipFill>
         <p:spPr>
           <a:xfrm>
-            <a:off x="2909301" y="5328561"/>
+            <a:off x="2909301" y="5242298"/>
             <a:ext cx="6588000" cy="19764"/>
           </a:xfrm>
           <a:prstGeom prst="rect">
@@ -8573,7 +8597,7 @@
         </p:blipFill>
         <p:spPr>
           <a:xfrm>
-            <a:off x="3352555" y="5903555"/>
+            <a:off x="3352555" y="5774162"/>
             <a:ext cx="629948" cy="629948"/>
           </a:xfrm>
           <a:prstGeom prst="rect">
@@ -10764,7 +10788,7 @@
         </p:nvSpPr>
         <p:spPr>
           <a:xfrm>
-            <a:off x="1276159" y="456582"/>
+            <a:off x="1367289" y="594814"/>
             <a:ext cx="9404350" cy="1400175"/>
           </a:xfrm>
         </p:spPr>
@@ -10836,8 +10860,8 @@
         </p:blipFill>
         <p:spPr>
           <a:xfrm>
-            <a:off x="1282228" y="525514"/>
-            <a:ext cx="560886" cy="560886"/>
+            <a:off x="1394022" y="655780"/>
+            <a:ext cx="476799" cy="476799"/>
           </a:xfrm>
           <a:prstGeom prst="rect">
             <a:avLst/>
@@ -11076,18 +11100,28 @@
             </a:pPr>
             <a:r>
               <a:rPr lang="en-US" sz="2800" dirty="0"/>
-              <a:t>Description: A splash screen is a graphical control element consisting of a window containing an image, a logo, and the current version of the software. A splash screen usually appears while a game or program is launching.</a:t>
+              <a:t>Provides the Employer the ability to directly intervene with an existing schedule (</a:t>
             </a:r>
-          </a:p>
-          <a:p>
-            <a:pPr algn="l" rtl="0">
-              <a:buFont typeface="Wingdings" panose="05000000000000000000" pitchFamily="2" charset="2"/>
-              <a:buChar char="§"/>
-            </a:pPr>
+            <a:r>
+              <a:rPr lang="en-US" sz="2800" dirty="0" err="1"/>
+              <a:t>i.e</a:t>
+            </a:r>
             <a:r>
               <a:rPr lang="en-US" sz="2800" dirty="0"/>
-              <a:t>Splash screens are typically used by applications to notify the user that the program is in the process of loading.</a:t>
+              <a:t>: an Employee called in sick).</a:t>
             </a:r>
+          </a:p>
+          <a:p>
+            <a:pPr algn="l" rtl="0"/>
+            <a:endParaRPr lang="en-US" sz="2800" dirty="0"/>
+          </a:p>
+          <a:p>
+            <a:pPr algn="l" rtl="0"/>
+            <a:endParaRPr lang="en-US" sz="2800" dirty="0"/>
+          </a:p>
+          <a:p>
+            <a:pPr algn="l" rtl="0"/>
+            <a:endParaRPr lang="en-US" sz="2800" dirty="0"/>
           </a:p>
           <a:p>
             <a:pPr algn="l" rtl="0"/>
@@ -11140,7 +11174,7 @@
         </p:blipFill>
         <p:spPr>
           <a:xfrm>
-            <a:off x="3238866" y="5523238"/>
+            <a:off x="3238866" y="5359342"/>
             <a:ext cx="325148" cy="325148"/>
           </a:xfrm>
           <a:prstGeom prst="rect">
@@ -11170,7 +11204,7 @@
         </p:blipFill>
         <p:spPr>
           <a:xfrm>
-            <a:off x="2909301" y="5328561"/>
+            <a:off x="2909301" y="5233675"/>
             <a:ext cx="6588000" cy="19764"/>
           </a:xfrm>
           <a:prstGeom prst="rect">
@@ -11383,7 +11417,7 @@
         </p:blipFill>
         <p:spPr>
           <a:xfrm>
-            <a:off x="3249040" y="5903555"/>
+            <a:off x="3249040" y="5739659"/>
             <a:ext cx="629948" cy="629948"/>
           </a:xfrm>
           <a:prstGeom prst="rect">
@@ -11613,8 +11647,17 @@
                   <a:schemeClr val="tx1"/>
                 </a:solidFill>
               </a:rPr>
-              <a:t>Agenda/Daily view of schedule</a:t>
+              <a:t>Daily view of schedule (U</a:t>
             </a:r>
+            <a:r>
+              <a:rPr lang="en-US" sz="4400" dirty="0"/>
+              <a:t>ser)</a:t>
+            </a:r>
+            <a:endParaRPr lang="en-US" dirty="0">
+              <a:solidFill>
+                <a:schemeClr val="tx1"/>
+              </a:solidFill>
+            </a:endParaRPr>
           </a:p>
         </p:txBody>
       </p:sp>
@@ -11670,7 +11713,7 @@
         </p:blipFill>
         <p:spPr>
           <a:xfrm>
-            <a:off x="1938000" y="525514"/>
+            <a:off x="2174858" y="543063"/>
             <a:ext cx="560886" cy="560886"/>
           </a:xfrm>
           <a:prstGeom prst="rect">
@@ -11905,26 +11948,39 @@
           </a:lstStyle>
           <a:p>
             <a:pPr algn="l" rtl="0">
-              <a:buFont typeface="Wingdings" panose="05000000000000000000" pitchFamily="2" charset="2"/>
-              <a:buChar char="§"/>
+              <a:buFont typeface="Arial" panose="020B0604020202020204" pitchFamily="34" charset="0"/>
+              <a:buChar char="•"/>
             </a:pPr>
             <a:r>
               <a:rPr lang="en-US" sz="2800" dirty="0"/>
-              <a:t>Description: A splash screen is a graphical control element consisting of a window containing an image, a logo, and the current version of the software. A splash screen usually appears while a game or program is launching.</a:t>
+              <a:t>After a schedule has been made, every User would be able to view the daily schedule (of all other members as well).</a:t>
             </a:r>
           </a:p>
           <a:p>
-            <a:pPr algn="l" rtl="0">
-              <a:buFont typeface="Wingdings" panose="05000000000000000000" pitchFamily="2" charset="2"/>
-              <a:buChar char="§"/>
+            <a:pPr marL="0" indent="0" algn="ctr" rtl="0">
+              <a:buNone/>
+            </a:pPr>
+            <a:endParaRPr lang="en-US" sz="2800" dirty="0"/>
+          </a:p>
+          <a:p>
+            <a:pPr marL="0" indent="0" algn="ctr" rtl="0">
+              <a:buNone/>
             </a:pPr>
             <a:r>
               <a:rPr lang="en-US" sz="2800" dirty="0"/>
-              <a:t>Splash screens are typically used by applications to notify the user that the program is in the process of loading.</a:t>
+              <a:t>	</a:t>
             </a:r>
           </a:p>
           <a:p>
-            <a:pPr algn="l" rtl="0"/>
+            <a:pPr marL="0" indent="0" algn="ctr" rtl="0">
+              <a:buNone/>
+            </a:pPr>
+            <a:endParaRPr lang="en-US" sz="2800" dirty="0"/>
+          </a:p>
+          <a:p>
+            <a:pPr marL="0" indent="0" algn="ctr" rtl="0">
+              <a:buNone/>
+            </a:pPr>
             <a:endParaRPr lang="en-US" sz="2800" dirty="0"/>
           </a:p>
           <a:p>
@@ -11933,7 +11989,7 @@
             </a:pPr>
             <a:r>
               <a:rPr lang="en-US" sz="2800" dirty="0"/>
-              <a:t>	Estimated development time: 7 hours</a:t>
+              <a:t>Estimated development time: 4 hours</a:t>
             </a:r>
           </a:p>
           <a:p>
@@ -11969,7 +12025,7 @@
         </p:blipFill>
         <p:spPr>
           <a:xfrm>
-            <a:off x="3238866" y="5523238"/>
+            <a:off x="2971450" y="5385222"/>
             <a:ext cx="325148" cy="325148"/>
           </a:xfrm>
           <a:prstGeom prst="rect">
@@ -11999,7 +12055,7 @@
         </p:blipFill>
         <p:spPr>
           <a:xfrm>
-            <a:off x="2909301" y="5328561"/>
+            <a:off x="2909301" y="5121527"/>
             <a:ext cx="6588000" cy="19764"/>
           </a:xfrm>
           <a:prstGeom prst="rect">
@@ -12063,7 +12119,7 @@
         </p:nvGrpSpPr>
         <p:grpSpPr>
           <a:xfrm>
-            <a:off x="-1382946" y="5808342"/>
+            <a:off x="-1382946" y="5766923"/>
             <a:ext cx="15891426" cy="2636520"/>
             <a:chOff x="-1382946" y="5737222"/>
             <a:chExt cx="15891426" cy="2636520"/>
@@ -12212,7 +12268,7 @@
         </p:blipFill>
         <p:spPr>
           <a:xfrm>
-            <a:off x="3249040" y="5903555"/>
+            <a:off x="3249040" y="5765539"/>
             <a:ext cx="629948" cy="629948"/>
           </a:xfrm>
           <a:prstGeom prst="rect">
@@ -12406,8 +12462,17 @@
                   <a:schemeClr val="tx1"/>
                 </a:solidFill>
               </a:rPr>
-              <a:t>Schedule sharing &amp; exporting</a:t>
+              <a:t>Agenda view of schedule (U</a:t>
             </a:r>
+            <a:r>
+              <a:rPr lang="en-US" sz="4400" dirty="0"/>
+              <a:t>ser)</a:t>
+            </a:r>
+            <a:endParaRPr lang="en-US" dirty="0">
+              <a:solidFill>
+                <a:schemeClr val="tx1"/>
+              </a:solidFill>
+            </a:endParaRPr>
           </a:p>
         </p:txBody>
       </p:sp>
@@ -12463,7 +12528,7 @@
         </p:blipFill>
         <p:spPr>
           <a:xfrm>
-            <a:off x="2101741" y="522317"/>
+            <a:off x="1899426" y="533827"/>
             <a:ext cx="560886" cy="560886"/>
           </a:xfrm>
           <a:prstGeom prst="rect">
@@ -12698,26 +12763,39 @@
           </a:lstStyle>
           <a:p>
             <a:pPr algn="l" rtl="0">
-              <a:buFont typeface="Wingdings" panose="05000000000000000000" pitchFamily="2" charset="2"/>
-              <a:buChar char="§"/>
+              <a:buFont typeface="Arial" panose="020B0604020202020204" pitchFamily="34" charset="0"/>
+              <a:buChar char="•"/>
             </a:pPr>
             <a:r>
               <a:rPr lang="en-US" sz="2800" dirty="0"/>
-              <a:t>Description: A splash screen is a graphical control element consisting of a window containing an image, a logo, and the current version of the software. A splash screen usually appears while a game or program is launching.</a:t>
+              <a:t>After a schedule has been made, every User would be able to view his specific weekly schedule.</a:t>
             </a:r>
           </a:p>
           <a:p>
-            <a:pPr algn="l" rtl="0">
-              <a:buFont typeface="Wingdings" panose="05000000000000000000" pitchFamily="2" charset="2"/>
-              <a:buChar char="§"/>
+            <a:pPr marL="0" indent="0" algn="l" rtl="0">
+              <a:buNone/>
+            </a:pPr>
+            <a:endParaRPr lang="en-US" sz="2800" dirty="0"/>
+          </a:p>
+          <a:p>
+            <a:pPr marL="0" indent="0" algn="ctr" rtl="0">
+              <a:buNone/>
             </a:pPr>
             <a:r>
               <a:rPr lang="en-US" sz="2800" dirty="0"/>
-              <a:t>Splash screens are typically used by applications to notify the user that the program is in the process of loading.</a:t>
+              <a:t>	</a:t>
             </a:r>
           </a:p>
           <a:p>
-            <a:pPr algn="l" rtl="0"/>
+            <a:pPr marL="0" indent="0" algn="ctr" rtl="0">
+              <a:buNone/>
+            </a:pPr>
+            <a:endParaRPr lang="en-US" sz="2800" dirty="0"/>
+          </a:p>
+          <a:p>
+            <a:pPr marL="0" indent="0" algn="ctr" rtl="0">
+              <a:buNone/>
+            </a:pPr>
             <a:endParaRPr lang="en-US" sz="2800" dirty="0"/>
           </a:p>
           <a:p>
@@ -12726,7 +12804,7 @@
             </a:pPr>
             <a:r>
               <a:rPr lang="en-US" sz="2800" dirty="0"/>
-              <a:t>	Estimated development time: 3 hours</a:t>
+              <a:t>Estimated development time: 4 hours</a:t>
             </a:r>
           </a:p>
           <a:p>
@@ -12762,7 +12840,7 @@
         </p:blipFill>
         <p:spPr>
           <a:xfrm>
-            <a:off x="3238866" y="5523238"/>
+            <a:off x="2971450" y="5385222"/>
             <a:ext cx="325148" cy="325148"/>
           </a:xfrm>
           <a:prstGeom prst="rect">
@@ -12792,7 +12870,7 @@
         </p:blipFill>
         <p:spPr>
           <a:xfrm>
-            <a:off x="2909301" y="5328561"/>
+            <a:off x="2909301" y="5121527"/>
             <a:ext cx="6588000" cy="19764"/>
           </a:xfrm>
           <a:prstGeom prst="rect">
@@ -12856,7 +12934,7 @@
         </p:nvGrpSpPr>
         <p:grpSpPr>
           <a:xfrm>
-            <a:off x="-1382946" y="5808342"/>
+            <a:off x="-1382946" y="5766923"/>
             <a:ext cx="15891426" cy="2636520"/>
             <a:chOff x="-1382946" y="5737222"/>
             <a:chExt cx="15891426" cy="2636520"/>
@@ -13005,7 +13083,7 @@
         </p:blipFill>
         <p:spPr>
           <a:xfrm>
-            <a:off x="3249040" y="5903555"/>
+            <a:off x="3249040" y="5765539"/>
             <a:ext cx="629948" cy="629948"/>
           </a:xfrm>
           <a:prstGeom prst="rect">
@@ -13018,7 +13096,7 @@
           <p:cNvPr id="17" name="TextBox 16">
             <a:extLst>
               <a:ext uri="{FF2B5EF4-FFF2-40B4-BE49-F238E27FC236}">
-                <a16:creationId xmlns:a16="http://schemas.microsoft.com/office/drawing/2014/main" id="{C833CE84-FE9B-4789-921E-520CB95868C7}"/>
+                <a16:creationId xmlns:a16="http://schemas.microsoft.com/office/drawing/2014/main" id="{F196352C-E864-4ADA-95A8-3144E3DDF826}"/>
               </a:ext>
             </a:extLst>
           </p:cNvPr>
@@ -13054,7 +13132,7 @@
           <p:cNvPr id="18" name="Cylinder 17">
             <a:extLst>
               <a:ext uri="{FF2B5EF4-FFF2-40B4-BE49-F238E27FC236}">
-                <a16:creationId xmlns:a16="http://schemas.microsoft.com/office/drawing/2014/main" id="{13087DCE-F035-494B-8727-3968302E9384}"/>
+                <a16:creationId xmlns:a16="http://schemas.microsoft.com/office/drawing/2014/main" id="{B55BCB2D-CA92-4CD1-96D1-2C57DD6F1ADF}"/>
               </a:ext>
             </a:extLst>
           </p:cNvPr>
@@ -13063,8 +13141,8 @@
         </p:nvSpPr>
         <p:spPr>
           <a:xfrm>
-            <a:off x="11730896" y="6364072"/>
-            <a:ext cx="298180" cy="369332"/>
+            <a:off x="11730896" y="6255864"/>
+            <a:ext cx="298180" cy="477540"/>
           </a:xfrm>
           <a:prstGeom prst="can">
             <a:avLst>
@@ -13074,19 +13152,19 @@
           <a:gradFill flip="none" rotWithShape="1">
             <a:gsLst>
               <a:gs pos="0">
-                <a:srgbClr val="FFC000">
+                <a:srgbClr val="FF0000">
                   <a:shade val="30000"/>
                   <a:satMod val="115000"/>
                 </a:srgbClr>
               </a:gs>
               <a:gs pos="50000">
-                <a:srgbClr val="FFC000">
+                <a:srgbClr val="FF0000">
                   <a:shade val="67500"/>
                   <a:satMod val="115000"/>
                 </a:srgbClr>
               </a:gs>
               <a:gs pos="100000">
-                <a:srgbClr val="FFC000">
+                <a:srgbClr val="FF0000">
                   <a:shade val="100000"/>
                   <a:satMod val="115000"/>
                 </a:srgbClr>
@@ -13127,7 +13205,7 @@
     </p:spTree>
     <p:extLst>
       <p:ext uri="{BB962C8B-B14F-4D97-AF65-F5344CB8AC3E}">
-        <p14:creationId xmlns:p14="http://schemas.microsoft.com/office/powerpoint/2010/main" val="3472932636"/>
+        <p14:creationId xmlns:p14="http://schemas.microsoft.com/office/powerpoint/2010/main" val="183153299"/>
       </p:ext>
     </p:extLst>
   </p:cSld>
@@ -13199,8 +13277,17 @@
                   <a:schemeClr val="tx1"/>
                 </a:solidFill>
               </a:rPr>
-              <a:t>Shift swapping request (Employee)</a:t>
+              <a:t>Schedule sharing &amp; exporting (U</a:t>
             </a:r>
+            <a:r>
+              <a:rPr lang="en-US" sz="4400" dirty="0"/>
+              <a:t>ser)</a:t>
+            </a:r>
+            <a:endParaRPr lang="en-US" dirty="0">
+              <a:solidFill>
+                <a:schemeClr val="tx1"/>
+              </a:solidFill>
+            </a:endParaRPr>
           </a:p>
         </p:txBody>
       </p:sp>
@@ -13256,7 +13343,7 @@
         </p:blipFill>
         <p:spPr>
           <a:xfrm>
-            <a:off x="1511491" y="511156"/>
+            <a:off x="1377114" y="502530"/>
             <a:ext cx="560886" cy="560886"/>
           </a:xfrm>
           <a:prstGeom prst="rect">
@@ -13496,18 +13583,37 @@
             </a:pPr>
             <a:r>
               <a:rPr lang="en-US" sz="2800" dirty="0"/>
-              <a:t>Description: A splash screen is a graphical control element consisting of a window containing an image, a logo, and the current version of the software. A splash screen usually appears while a game or program is launching.</a:t>
+              <a:t>After a schedule has been made, every User would have the ability to share it via other apps (</a:t>
             </a:r>
+            <a:r>
+              <a:rPr lang="en-US" sz="2800" dirty="0" err="1"/>
+              <a:t>i.e</a:t>
+            </a:r>
+            <a:r>
+              <a:rPr lang="en-US" sz="2800" dirty="0"/>
+              <a:t> “WhatsApp”) or export it to a spreadsheet (</a:t>
+            </a:r>
+            <a:r>
+              <a:rPr lang="en-US" sz="2800" dirty="0" err="1"/>
+              <a:t>i.e</a:t>
+            </a:r>
+            <a:r>
+              <a:rPr lang="en-US" sz="2800" dirty="0"/>
+              <a:t> “Microsoft Excel”).</a:t>
+            </a:r>
+          </a:p>
+          <a:p>
+            <a:pPr marL="0" indent="0" algn="l" rtl="0">
+              <a:buNone/>
+            </a:pPr>
+            <a:endParaRPr lang="en-US" sz="2800" dirty="0"/>
           </a:p>
           <a:p>
             <a:pPr algn="l" rtl="0">
               <a:buFont typeface="Wingdings" panose="05000000000000000000" pitchFamily="2" charset="2"/>
               <a:buChar char="§"/>
             </a:pPr>
-            <a:r>
-              <a:rPr lang="en-US" sz="2800" dirty="0"/>
-              <a:t>Splash screens are typically used by applications to notify the user that the program is in the process of loading.</a:t>
-            </a:r>
+            <a:endParaRPr lang="en-US" sz="2800" dirty="0"/>
           </a:p>
           <a:p>
             <a:pPr algn="l" rtl="0"/>
@@ -13519,7 +13625,7 @@
             </a:pPr>
             <a:r>
               <a:rPr lang="en-US" sz="2800" dirty="0"/>
-              <a:t>	Estimated development time: 6 hours</a:t>
+              <a:t>	Estimated development time: 3 hours</a:t>
             </a:r>
           </a:p>
           <a:p>
@@ -13528,13 +13634,8 @@
             </a:pPr>
             <a:r>
               <a:rPr lang="en-US" sz="2800" dirty="0"/>
-              <a:t>Teammate responsible: </a:t>
+              <a:t>Teammate responsible: Oshri</a:t>
             </a:r>
-            <a:r>
-              <a:rPr lang="en-US" sz="2800" dirty="0" err="1"/>
-              <a:t>Yakir</a:t>
-            </a:r>
-            <a:endParaRPr lang="en-US" sz="2800" dirty="0"/>
           </a:p>
         </p:txBody>
       </p:sp>
@@ -13560,7 +13661,7 @@
         </p:blipFill>
         <p:spPr>
           <a:xfrm>
-            <a:off x="3238866" y="5523238"/>
+            <a:off x="3126727" y="5212688"/>
             <a:ext cx="325148" cy="325148"/>
           </a:xfrm>
           <a:prstGeom prst="rect">
@@ -13590,7 +13691,7 @@
         </p:blipFill>
         <p:spPr>
           <a:xfrm>
-            <a:off x="2909301" y="5328561"/>
+            <a:off x="2909301" y="5026641"/>
             <a:ext cx="6588000" cy="19764"/>
           </a:xfrm>
           <a:prstGeom prst="rect">
@@ -13803,7 +13904,7 @@
         </p:blipFill>
         <p:spPr>
           <a:xfrm>
-            <a:off x="3249040" y="5903555"/>
+            <a:off x="3136901" y="5593005"/>
             <a:ext cx="629948" cy="629948"/>
           </a:xfrm>
           <a:prstGeom prst="rect">
@@ -13813,10 +13914,10 @@
       </p:pic>
       <p:sp>
         <p:nvSpPr>
-          <p:cNvPr id="18" name="TextBox 17">
+          <p:cNvPr id="17" name="TextBox 16">
             <a:extLst>
               <a:ext uri="{FF2B5EF4-FFF2-40B4-BE49-F238E27FC236}">
-                <a16:creationId xmlns:a16="http://schemas.microsoft.com/office/drawing/2014/main" id="{5363C813-0E7C-44B4-9D49-F0AFDC1CDCF6}"/>
+                <a16:creationId xmlns:a16="http://schemas.microsoft.com/office/drawing/2014/main" id="{C833CE84-FE9B-4789-921E-520CB95868C7}"/>
               </a:ext>
             </a:extLst>
           </p:cNvPr>
@@ -13825,8 +13926,8 @@
         </p:nvSpPr>
         <p:spPr>
           <a:xfrm>
-            <a:off x="77284" y="6427536"/>
-            <a:ext cx="7220663" cy="369332"/>
+            <a:off x="10680509" y="6377605"/>
+            <a:ext cx="1290769" cy="369332"/>
           </a:xfrm>
           <a:prstGeom prst="rect">
             <a:avLst/>
@@ -13841,7 +13942,7 @@
           <a:p>
             <a:r>
               <a:rPr lang="en-US" dirty="0"/>
-              <a:t>Risk: Similar to manually update</a:t>
+              <a:t>Difficulty:</a:t>
             </a:r>
             <a:endParaRPr lang="he-IL" dirty="0"/>
           </a:p>
@@ -13849,46 +13950,10 @@
       </p:sp>
       <p:sp>
         <p:nvSpPr>
-          <p:cNvPr id="20" name="TextBox 19">
+          <p:cNvPr id="18" name="Cylinder 17">
             <a:extLst>
               <a:ext uri="{FF2B5EF4-FFF2-40B4-BE49-F238E27FC236}">
-                <a16:creationId xmlns:a16="http://schemas.microsoft.com/office/drawing/2014/main" id="{1F2F172F-AABB-4B97-B4A2-F0D2A9AF0442}"/>
-              </a:ext>
-            </a:extLst>
-          </p:cNvPr>
-          <p:cNvSpPr txBox="1"/>
-          <p:nvPr/>
-        </p:nvSpPr>
-        <p:spPr>
-          <a:xfrm>
-            <a:off x="10680509" y="6377605"/>
-            <a:ext cx="1290769" cy="369332"/>
-          </a:xfrm>
-          <a:prstGeom prst="rect">
-            <a:avLst/>
-          </a:prstGeom>
-          <a:noFill/>
-        </p:spPr>
-        <p:txBody>
-          <a:bodyPr wrap="square" rtlCol="1">
-            <a:spAutoFit/>
-          </a:bodyPr>
-          <a:lstStyle/>
-          <a:p>
-            <a:r>
-              <a:rPr lang="en-US" dirty="0"/>
-              <a:t>Difficulty:</a:t>
-            </a:r>
-            <a:endParaRPr lang="he-IL" dirty="0"/>
-          </a:p>
-        </p:txBody>
-      </p:sp>
-      <p:sp>
-        <p:nvSpPr>
-          <p:cNvPr id="21" name="Cylinder 20">
-            <a:extLst>
-              <a:ext uri="{FF2B5EF4-FFF2-40B4-BE49-F238E27FC236}">
-                <a16:creationId xmlns:a16="http://schemas.microsoft.com/office/drawing/2014/main" id="{E55DBD6D-1CC6-468B-B125-B78577594CA8}"/>
+                <a16:creationId xmlns:a16="http://schemas.microsoft.com/office/drawing/2014/main" id="{13087DCE-F035-494B-8727-3968302E9384}"/>
               </a:ext>
             </a:extLst>
           </p:cNvPr>
@@ -13961,7 +14026,7 @@
     </p:spTree>
     <p:extLst>
       <p:ext uri="{BB962C8B-B14F-4D97-AF65-F5344CB8AC3E}">
-        <p14:creationId xmlns:p14="http://schemas.microsoft.com/office/powerpoint/2010/main" val="3973915173"/>
+        <p14:creationId xmlns:p14="http://schemas.microsoft.com/office/powerpoint/2010/main" val="3472932636"/>
       </p:ext>
     </p:extLst>
   </p:cSld>
@@ -14033,7 +14098,7 @@
                   <a:schemeClr val="tx1"/>
                 </a:solidFill>
               </a:rPr>
-              <a:t>Synchronization with Google calendar </a:t>
+              <a:t>Shift swapping request (Employee)</a:t>
             </a:r>
           </a:p>
         </p:txBody>
@@ -14090,7 +14155,7 @@
         </p:blipFill>
         <p:spPr>
           <a:xfrm>
-            <a:off x="1103312" y="557324"/>
+            <a:off x="1511491" y="511156"/>
             <a:ext cx="560886" cy="560886"/>
           </a:xfrm>
           <a:prstGeom prst="rect">
@@ -14330,7 +14395,7 @@
             </a:pPr>
             <a:r>
               <a:rPr lang="en-US" sz="2800" dirty="0"/>
-              <a:t>Description: A splash screen is a graphical control element consisting of a window containing an image, a logo, and the current version of the software. A splash screen usually appears while a game or program is launching.</a:t>
+              <a:t>Provides the Employee the ability to request a shift swapping with another Employee and notifying the Employer.</a:t>
             </a:r>
           </a:p>
           <a:p>
@@ -14340,11 +14405,17 @@
             </a:pPr>
             <a:r>
               <a:rPr lang="en-US" sz="2800" dirty="0"/>
-              <a:t>Splash screens are typically used by applications to notify the user that the program is in the process of loading.</a:t>
+              <a:t>By approving the request, the previous schedule will be updated accordingly (without reapplying the main algorithm).</a:t>
             </a:r>
           </a:p>
           <a:p>
             <a:pPr algn="l" rtl="0"/>
+            <a:endParaRPr lang="en-US" sz="2800" dirty="0"/>
+          </a:p>
+          <a:p>
+            <a:pPr marL="0" indent="0" algn="l" rtl="0">
+              <a:buNone/>
+            </a:pPr>
             <a:endParaRPr lang="en-US" sz="2800" dirty="0"/>
           </a:p>
           <a:p>
@@ -14362,8 +14433,13 @@
             </a:pPr>
             <a:r>
               <a:rPr lang="en-US" sz="2800" dirty="0"/>
-              <a:t>Teammate responsible: Gal</a:t>
+              <a:t>Teammate responsible: </a:t>
             </a:r>
+            <a:r>
+              <a:rPr lang="en-US" sz="2800" dirty="0" err="1"/>
+              <a:t>Yakir</a:t>
+            </a:r>
+            <a:endParaRPr lang="en-US" sz="2800" dirty="0"/>
           </a:p>
         </p:txBody>
       </p:sp>
@@ -14389,7 +14465,7 @@
         </p:blipFill>
         <p:spPr>
           <a:xfrm>
-            <a:off x="3238866" y="5523238"/>
+            <a:off x="3238866" y="5229942"/>
             <a:ext cx="325148" cy="325148"/>
           </a:xfrm>
           <a:prstGeom prst="rect">
@@ -14419,8 +14495,8 @@
         </p:blipFill>
         <p:spPr>
           <a:xfrm>
-            <a:off x="2909301" y="5328561"/>
-            <a:ext cx="6588000" cy="19764"/>
+            <a:off x="2579901" y="5129167"/>
+            <a:ext cx="7246800" cy="21740"/>
           </a:xfrm>
           <a:prstGeom prst="rect">
             <a:avLst/>
@@ -14632,7 +14708,7 @@
         </p:blipFill>
         <p:spPr>
           <a:xfrm>
-            <a:off x="3249040" y="5903555"/>
+            <a:off x="3249040" y="5610259"/>
             <a:ext cx="629948" cy="629948"/>
           </a:xfrm>
           <a:prstGeom prst="rect">
@@ -14642,10 +14718,10 @@
       </p:pic>
       <p:sp>
         <p:nvSpPr>
-          <p:cNvPr id="16" name="TextBox 15">
+          <p:cNvPr id="18" name="TextBox 17">
             <a:extLst>
               <a:ext uri="{FF2B5EF4-FFF2-40B4-BE49-F238E27FC236}">
-                <a16:creationId xmlns:a16="http://schemas.microsoft.com/office/drawing/2014/main" id="{FC1D612A-D9D0-4E04-B15D-C02789FDB3BD}"/>
+                <a16:creationId xmlns:a16="http://schemas.microsoft.com/office/drawing/2014/main" id="{5363C813-0E7C-44B4-9D49-F0AFDC1CDCF6}"/>
               </a:ext>
             </a:extLst>
           </p:cNvPr>
@@ -14654,8 +14730,8 @@
         </p:nvSpPr>
         <p:spPr>
           <a:xfrm>
-            <a:off x="10680509" y="6377605"/>
-            <a:ext cx="1290769" cy="369332"/>
+            <a:off x="77284" y="6427536"/>
+            <a:ext cx="7220663" cy="369332"/>
           </a:xfrm>
           <a:prstGeom prst="rect">
             <a:avLst/>
@@ -14670,7 +14746,7 @@
           <a:p>
             <a:r>
               <a:rPr lang="en-US" dirty="0"/>
-              <a:t>Difficulty:</a:t>
+              <a:t>Risk: Similar to manually update</a:t>
             </a:r>
             <a:endParaRPr lang="he-IL" dirty="0"/>
           </a:p>
@@ -14678,10 +14754,46 @@
       </p:sp>
       <p:sp>
         <p:nvSpPr>
-          <p:cNvPr id="18" name="Cylinder 17">
+          <p:cNvPr id="20" name="TextBox 19">
             <a:extLst>
               <a:ext uri="{FF2B5EF4-FFF2-40B4-BE49-F238E27FC236}">
-                <a16:creationId xmlns:a16="http://schemas.microsoft.com/office/drawing/2014/main" id="{ADFB6E93-8B67-466F-A79E-E0583EC553F0}"/>
+                <a16:creationId xmlns:a16="http://schemas.microsoft.com/office/drawing/2014/main" id="{1F2F172F-AABB-4B97-B4A2-F0D2A9AF0442}"/>
+              </a:ext>
+            </a:extLst>
+          </p:cNvPr>
+          <p:cNvSpPr txBox="1"/>
+          <p:nvPr/>
+        </p:nvSpPr>
+        <p:spPr>
+          <a:xfrm>
+            <a:off x="10680509" y="6377605"/>
+            <a:ext cx="1290769" cy="369332"/>
+          </a:xfrm>
+          <a:prstGeom prst="rect">
+            <a:avLst/>
+          </a:prstGeom>
+          <a:noFill/>
+        </p:spPr>
+        <p:txBody>
+          <a:bodyPr wrap="square" rtlCol="1">
+            <a:spAutoFit/>
+          </a:bodyPr>
+          <a:lstStyle/>
+          <a:p>
+            <a:r>
+              <a:rPr lang="en-US" dirty="0"/>
+              <a:t>Difficulty:</a:t>
+            </a:r>
+            <a:endParaRPr lang="he-IL" dirty="0"/>
+          </a:p>
+        </p:txBody>
+      </p:sp>
+      <p:sp>
+        <p:nvSpPr>
+          <p:cNvPr id="21" name="Cylinder 20">
+            <a:extLst>
+              <a:ext uri="{FF2B5EF4-FFF2-40B4-BE49-F238E27FC236}">
+                <a16:creationId xmlns:a16="http://schemas.microsoft.com/office/drawing/2014/main" id="{E55DBD6D-1CC6-468B-B125-B78577594CA8}"/>
               </a:ext>
             </a:extLst>
           </p:cNvPr>
@@ -14754,7 +14866,7 @@
     </p:spTree>
     <p:extLst>
       <p:ext uri="{BB962C8B-B14F-4D97-AF65-F5344CB8AC3E}">
-        <p14:creationId xmlns:p14="http://schemas.microsoft.com/office/powerpoint/2010/main" val="3537731887"/>
+        <p14:creationId xmlns:p14="http://schemas.microsoft.com/office/powerpoint/2010/main" val="3973915173"/>
       </p:ext>
     </p:extLst>
   </p:cSld>
@@ -14811,10 +14923,9 @@
         </p:nvSpPr>
         <p:spPr>
           <a:xfrm>
-            <a:off x="1276159" y="456582"/>
+            <a:off x="1393825" y="4277359"/>
             <a:ext cx="9404350" cy="1400175"/>
           </a:xfrm>
-          <a:effectLst/>
         </p:spPr>
         <p:txBody>
           <a:bodyPr/>
@@ -14822,22 +14933,29 @@
           <a:p>
             <a:pPr algn="ctr"/>
             <a:r>
-              <a:rPr lang="en-US" dirty="0">
+              <a:rPr lang="en-US" sz="6000" dirty="0">
                 <a:solidFill>
                   <a:schemeClr val="tx1"/>
                 </a:solidFill>
+                <a:effectLst>
+                  <a:outerShdw blurRad="63500" sx="102000" sy="102000" algn="ctr" rotWithShape="0">
+                    <a:prstClr val="black">
+                      <a:alpha val="40000"/>
+                    </a:prstClr>
+                  </a:outerShdw>
+                </a:effectLst>
               </a:rPr>
-              <a:t>Introduction</a:t>
+              <a:t>Product Backlog</a:t>
             </a:r>
           </a:p>
         </p:txBody>
       </p:sp>
       <p:pic>
         <p:nvPicPr>
-          <p:cNvPr id="12" name="Picture 11">
+          <p:cNvPr id="4" name="Picture 3">
             <a:extLst>
               <a:ext uri="{FF2B5EF4-FFF2-40B4-BE49-F238E27FC236}">
-                <a16:creationId xmlns:a16="http://schemas.microsoft.com/office/drawing/2014/main" id="{36CDCE59-5203-4EF5-87F8-330A07C6E6B7}"/>
+                <a16:creationId xmlns:a16="http://schemas.microsoft.com/office/drawing/2014/main" id="{91E5A672-F6F7-404D-BF61-ABB6D9AF82C7}"/>
               </a:ext>
             </a:extLst>
           </p:cNvPr>
@@ -14854,42 +14972,15 @@
         </p:blipFill>
         <p:spPr>
           <a:xfrm>
-            <a:off x="3687622" y="344578"/>
-            <a:ext cx="759183" cy="759183"/>
+            <a:off x="4837189" y="1148595"/>
+            <a:ext cx="2864091" cy="2864091"/>
           </a:xfrm>
           <a:prstGeom prst="rect">
             <a:avLst/>
           </a:prstGeom>
-        </p:spPr>
-      </p:pic>
-      <p:pic>
-        <p:nvPicPr>
-          <p:cNvPr id="5" name="Picture 4">
-            <a:extLst>
-              <a:ext uri="{FF2B5EF4-FFF2-40B4-BE49-F238E27FC236}">
-                <a16:creationId xmlns:a16="http://schemas.microsoft.com/office/drawing/2014/main" id="{8B52C801-8561-4876-AC20-B62938ACB0D1}"/>
-              </a:ext>
-            </a:extLst>
-          </p:cNvPr>
-          <p:cNvPicPr>
-            <a:picLocks noChangeAspect="1"/>
-          </p:cNvPicPr>
-          <p:nvPr/>
-        </p:nvPicPr>
-        <p:blipFill>
-          <a:blip r:embed="rId3"/>
-          <a:stretch>
-            <a:fillRect/>
-          </a:stretch>
-        </p:blipFill>
-        <p:spPr>
-          <a:xfrm>
-            <a:off x="1938000" y="1233155"/>
-            <a:ext cx="8316000" cy="24948"/>
-          </a:xfrm>
-          <a:prstGeom prst="rect">
-            <a:avLst/>
-          </a:prstGeom>
+          <a:effectLst>
+            <a:reflection blurRad="6350" stA="15000" endPos="35000" dir="5400000" sy="-100000" algn="bl" rotWithShape="0"/>
+          </a:effectLst>
         </p:spPr>
       </p:pic>
       <p:sp>
@@ -14897,7 +14988,7 @@
           <p:cNvPr id="3" name="Slide Number Placeholder 2">
             <a:extLst>
               <a:ext uri="{FF2B5EF4-FFF2-40B4-BE49-F238E27FC236}">
-                <a16:creationId xmlns:a16="http://schemas.microsoft.com/office/drawing/2014/main" id="{0B46A298-D10F-4BCD-940E-D39D9A9EBB0D}"/>
+                <a16:creationId xmlns:a16="http://schemas.microsoft.com/office/drawing/2014/main" id="{16812F3E-E50F-4CC2-A5C5-959B03858CB5}"/>
               </a:ext>
             </a:extLst>
           </p:cNvPr>
@@ -14910,7 +15001,7 @@
         </p:nvSpPr>
         <p:spPr/>
         <p:txBody>
-          <a:bodyPr/>
+          <a:bodyPr vert="horz" lIns="91440" tIns="45720" rIns="91440" bIns="45720" rtlCol="0" anchor="b"/>
           <a:lstStyle/>
           <a:p>
             <a:fld id="{6D22F896-40B5-4ADD-8801-0D06FADFA095}" type="slidenum">
@@ -14921,6 +15012,7 @@
                   </a:schemeClr>
                 </a:solidFill>
               </a:rPr>
+              <a:pPr/>
               <a:t>2</a:t>
             </a:fld>
             <a:endParaRPr lang="en-US" dirty="0">
@@ -14938,7 +15030,7 @@
           <p:cNvPr id="9" name="Group 8">
             <a:extLst>
               <a:ext uri="{FF2B5EF4-FFF2-40B4-BE49-F238E27FC236}">
-                <a16:creationId xmlns:a16="http://schemas.microsoft.com/office/drawing/2014/main" id="{D9C97C93-BF98-4B3F-B93B-2D699F2F83F8}"/>
+                <a16:creationId xmlns:a16="http://schemas.microsoft.com/office/drawing/2014/main" id="{D1B5859B-3DB7-4F0E-8F83-774458D984BC}"/>
               </a:ext>
             </a:extLst>
           </p:cNvPr>
@@ -14958,7 +15050,7 @@
             <p:cNvPr id="10" name="Wave 9">
               <a:extLst>
                 <a:ext uri="{FF2B5EF4-FFF2-40B4-BE49-F238E27FC236}">
-                  <a16:creationId xmlns:a16="http://schemas.microsoft.com/office/drawing/2014/main" id="{1AC59EE5-06EE-4059-9A3B-B45CF03B3428}"/>
+                  <a16:creationId xmlns:a16="http://schemas.microsoft.com/office/drawing/2014/main" id="{B37C9314-8D12-4D7F-8174-6418BD263812}"/>
                 </a:ext>
               </a:extLst>
             </p:cNvPr>
@@ -15015,7 +15107,7 @@
             <p:cNvPr id="11" name="Wave 10">
               <a:extLst>
                 <a:ext uri="{FF2B5EF4-FFF2-40B4-BE49-F238E27FC236}">
-                  <a16:creationId xmlns:a16="http://schemas.microsoft.com/office/drawing/2014/main" id="{D798413A-FA89-4411-BF21-890E33D5954F}"/>
+                  <a16:creationId xmlns:a16="http://schemas.microsoft.com/office/drawing/2014/main" id="{03800D93-C80F-4650-8939-575C60688C71}"/>
                 </a:ext>
               </a:extLst>
             </p:cNvPr>
@@ -15071,7 +15163,7 @@
     </p:spTree>
     <p:extLst>
       <p:ext uri="{BB962C8B-B14F-4D97-AF65-F5344CB8AC3E}">
-        <p14:creationId xmlns:p14="http://schemas.microsoft.com/office/powerpoint/2010/main" val="4021927542"/>
+        <p14:creationId xmlns:p14="http://schemas.microsoft.com/office/powerpoint/2010/main" val="177306881"/>
       </p:ext>
     </p:extLst>
   </p:cSld>
@@ -15115,7 +15207,7 @@
           <p:cNvPr id="2" name="Title 1">
             <a:extLst>
               <a:ext uri="{FF2B5EF4-FFF2-40B4-BE49-F238E27FC236}">
-                <a16:creationId xmlns:a16="http://schemas.microsoft.com/office/drawing/2014/main" id="{2F7BDECF-398A-9B40-AC85-66605B9B4232}"/>
+                <a16:creationId xmlns:a16="http://schemas.microsoft.com/office/drawing/2014/main" id="{200E80F0-4B1E-794C-BB4F-E27AC3FC50C8}"/>
               </a:ext>
             </a:extLst>
           </p:cNvPr>
@@ -15123,33 +15215,37 @@
             <a:spLocks noGrp="1"/>
           </p:cNvSpPr>
           <p:nvPr>
-            <p:ph type="title"/>
+            <p:ph type="title" idx="4294967295"/>
           </p:nvPr>
         </p:nvSpPr>
         <p:spPr>
           <a:xfrm>
-            <a:off x="1683171" y="234912"/>
-            <a:ext cx="8825657" cy="1915647"/>
+            <a:off x="1276159" y="456582"/>
+            <a:ext cx="9404350" cy="1400175"/>
           </a:xfrm>
         </p:spPr>
         <p:txBody>
-          <a:bodyPr anchor="ctr"/>
+          <a:bodyPr/>
           <a:lstStyle/>
           <a:p>
             <a:pPr algn="ctr"/>
             <a:r>
-              <a:rPr lang="en-US" sz="6000" dirty="0"/>
-              <a:t>Nice to have</a:t>
+              <a:rPr lang="en-US" dirty="0">
+                <a:solidFill>
+                  <a:schemeClr val="tx1"/>
+                </a:solidFill>
+              </a:rPr>
+              <a:t>Synchronization with Google calendar </a:t>
             </a:r>
           </a:p>
         </p:txBody>
       </p:sp>
       <p:pic>
         <p:nvPicPr>
-          <p:cNvPr id="7" name="Picture 6">
+          <p:cNvPr id="5" name="Picture 4">
             <a:extLst>
               <a:ext uri="{FF2B5EF4-FFF2-40B4-BE49-F238E27FC236}">
-                <a16:creationId xmlns:a16="http://schemas.microsoft.com/office/drawing/2014/main" id="{E54E1617-0D24-45F4-90EC-DA0C41FA5DD2}"/>
+                <a16:creationId xmlns:a16="http://schemas.microsoft.com/office/drawing/2014/main" id="{8B52C801-8561-4876-AC20-B62938ACB0D1}"/>
               </a:ext>
             </a:extLst>
           </p:cNvPr>
@@ -15166,15 +15262,12 @@
         </p:blipFill>
         <p:spPr>
           <a:xfrm>
-            <a:off x="3824554" y="2525685"/>
-            <a:ext cx="2885553" cy="2885553"/>
+            <a:off x="1938000" y="1233155"/>
+            <a:ext cx="8316000" cy="24948"/>
           </a:xfrm>
           <a:prstGeom prst="rect">
             <a:avLst/>
           </a:prstGeom>
-          <a:effectLst>
-            <a:reflection blurRad="6350" stA="52000" endA="300" endPos="35000" dir="5400000" sy="-100000" algn="bl" rotWithShape="0"/>
-          </a:effectLst>
         </p:spPr>
       </p:pic>
       <p:pic>
@@ -15182,7 +15275,336 @@
           <p:cNvPr id="4" name="Picture 3">
             <a:extLst>
               <a:ext uri="{FF2B5EF4-FFF2-40B4-BE49-F238E27FC236}">
-                <a16:creationId xmlns:a16="http://schemas.microsoft.com/office/drawing/2014/main" id="{A3D5CDE3-CB25-49ED-AAF7-D79CFAC0069E}"/>
+                <a16:creationId xmlns:a16="http://schemas.microsoft.com/office/drawing/2014/main" id="{1EB5E8E0-C4CE-4ADE-9B30-6B23709B949F}"/>
+              </a:ext>
+            </a:extLst>
+          </p:cNvPr>
+          <p:cNvPicPr>
+            <a:picLocks noChangeAspect="1"/>
+          </p:cNvPicPr>
+          <p:nvPr/>
+        </p:nvPicPr>
+        <p:blipFill>
+          <a:blip r:embed="rId3"/>
+          <a:stretch>
+            <a:fillRect/>
+          </a:stretch>
+        </p:blipFill>
+        <p:spPr>
+          <a:xfrm>
+            <a:off x="1103312" y="557324"/>
+            <a:ext cx="560886" cy="560886"/>
+          </a:xfrm>
+          <a:prstGeom prst="rect">
+            <a:avLst/>
+          </a:prstGeom>
+        </p:spPr>
+      </p:pic>
+      <p:sp>
+        <p:nvSpPr>
+          <p:cNvPr id="6" name="Content Placeholder 2">
+            <a:extLst>
+              <a:ext uri="{FF2B5EF4-FFF2-40B4-BE49-F238E27FC236}">
+                <a16:creationId xmlns:a16="http://schemas.microsoft.com/office/drawing/2014/main" id="{BCE9F960-C60B-4A03-8748-6288CCEC9669}"/>
+              </a:ext>
+            </a:extLst>
+          </p:cNvPr>
+          <p:cNvSpPr txBox="1">
+            <a:spLocks/>
+          </p:cNvSpPr>
+          <p:nvPr/>
+        </p:nvSpPr>
+        <p:spPr>
+          <a:xfrm>
+            <a:off x="1103312" y="2052918"/>
+            <a:ext cx="10064041" cy="4195481"/>
+          </a:xfrm>
+          <a:prstGeom prst="rect">
+            <a:avLst/>
+          </a:prstGeom>
+        </p:spPr>
+        <p:txBody>
+          <a:bodyPr/>
+          <a:lstStyle>
+            <a:lvl1pPr marL="342900" indent="-342900" algn="r" defTabSz="457200" rtl="1" eaLnBrk="1" latinLnBrk="0" hangingPunct="1">
+              <a:spcBef>
+                <a:spcPts val="1000"/>
+              </a:spcBef>
+              <a:spcAft>
+                <a:spcPts val="0"/>
+              </a:spcAft>
+              <a:buClr>
+                <a:schemeClr val="accent1"/>
+              </a:buClr>
+              <a:buSzPct val="80000"/>
+              <a:buFont typeface="Wingdings 3" charset="2"/>
+              <a:buChar char=""/>
+              <a:defRPr sz="2000" b="0" i="0" kern="1200">
+                <a:solidFill>
+                  <a:schemeClr val="tx1"/>
+                </a:solidFill>
+                <a:latin typeface="+mj-lt"/>
+                <a:ea typeface="+mj-ea"/>
+                <a:cs typeface="+mj-cs"/>
+              </a:defRPr>
+            </a:lvl1pPr>
+            <a:lvl2pPr marL="742950" indent="-285750" algn="r" defTabSz="457200" rtl="1" eaLnBrk="1" latinLnBrk="0" hangingPunct="1">
+              <a:spcBef>
+                <a:spcPts val="1000"/>
+              </a:spcBef>
+              <a:spcAft>
+                <a:spcPts val="0"/>
+              </a:spcAft>
+              <a:buClr>
+                <a:schemeClr val="accent1"/>
+              </a:buClr>
+              <a:buSzPct val="80000"/>
+              <a:buFont typeface="Wingdings 3" charset="2"/>
+              <a:buChar char=""/>
+              <a:defRPr sz="1800" b="0" i="0" kern="1200">
+                <a:solidFill>
+                  <a:schemeClr val="tx1"/>
+                </a:solidFill>
+                <a:latin typeface="+mj-lt"/>
+                <a:ea typeface="+mj-ea"/>
+                <a:cs typeface="+mj-cs"/>
+              </a:defRPr>
+            </a:lvl2pPr>
+            <a:lvl3pPr marL="1143000" indent="-228600" algn="r" defTabSz="457200" rtl="1" eaLnBrk="1" latinLnBrk="0" hangingPunct="1">
+              <a:spcBef>
+                <a:spcPts val="1000"/>
+              </a:spcBef>
+              <a:spcAft>
+                <a:spcPts val="0"/>
+              </a:spcAft>
+              <a:buClr>
+                <a:schemeClr val="accent1"/>
+              </a:buClr>
+              <a:buSzPct val="80000"/>
+              <a:buFont typeface="Wingdings 3" charset="2"/>
+              <a:buChar char=""/>
+              <a:defRPr sz="1600" b="0" i="0" kern="1200">
+                <a:solidFill>
+                  <a:schemeClr val="tx1"/>
+                </a:solidFill>
+                <a:latin typeface="+mj-lt"/>
+                <a:ea typeface="+mj-ea"/>
+                <a:cs typeface="+mj-cs"/>
+              </a:defRPr>
+            </a:lvl3pPr>
+            <a:lvl4pPr marL="1600200" indent="-228600" algn="r" defTabSz="457200" rtl="1" eaLnBrk="1" latinLnBrk="0" hangingPunct="1">
+              <a:spcBef>
+                <a:spcPts val="1000"/>
+              </a:spcBef>
+              <a:spcAft>
+                <a:spcPts val="0"/>
+              </a:spcAft>
+              <a:buClr>
+                <a:schemeClr val="accent1"/>
+              </a:buClr>
+              <a:buSzPct val="80000"/>
+              <a:buFont typeface="Wingdings 3" charset="2"/>
+              <a:buChar char=""/>
+              <a:defRPr sz="1400" b="0" i="0" kern="1200">
+                <a:solidFill>
+                  <a:schemeClr val="tx1"/>
+                </a:solidFill>
+                <a:latin typeface="+mj-lt"/>
+                <a:ea typeface="+mj-ea"/>
+                <a:cs typeface="+mj-cs"/>
+              </a:defRPr>
+            </a:lvl4pPr>
+            <a:lvl5pPr marL="2057400" indent="-228600" algn="r" defTabSz="457200" rtl="1" eaLnBrk="1" latinLnBrk="0" hangingPunct="1">
+              <a:spcBef>
+                <a:spcPts val="1000"/>
+              </a:spcBef>
+              <a:spcAft>
+                <a:spcPts val="0"/>
+              </a:spcAft>
+              <a:buClr>
+                <a:schemeClr val="accent1"/>
+              </a:buClr>
+              <a:buSzPct val="80000"/>
+              <a:buFont typeface="Wingdings 3" charset="2"/>
+              <a:buChar char=""/>
+              <a:defRPr sz="1400" b="0" i="0" kern="1200">
+                <a:solidFill>
+                  <a:schemeClr val="tx1"/>
+                </a:solidFill>
+                <a:latin typeface="+mj-lt"/>
+                <a:ea typeface="+mj-ea"/>
+                <a:cs typeface="+mj-cs"/>
+              </a:defRPr>
+            </a:lvl5pPr>
+            <a:lvl6pPr marL="2514600" indent="-228600" algn="r" defTabSz="457200" rtl="1" eaLnBrk="1" latinLnBrk="0" hangingPunct="1">
+              <a:spcBef>
+                <a:spcPts val="1000"/>
+              </a:spcBef>
+              <a:spcAft>
+                <a:spcPts val="0"/>
+              </a:spcAft>
+              <a:buClr>
+                <a:schemeClr val="accent1"/>
+              </a:buClr>
+              <a:buSzPct val="80000"/>
+              <a:buFont typeface="Wingdings 3" charset="2"/>
+              <a:buChar char=""/>
+              <a:defRPr sz="1400" b="0" i="0" kern="1200">
+                <a:solidFill>
+                  <a:schemeClr val="tx1"/>
+                </a:solidFill>
+                <a:latin typeface="+mj-lt"/>
+                <a:ea typeface="+mj-ea"/>
+                <a:cs typeface="+mj-cs"/>
+              </a:defRPr>
+            </a:lvl6pPr>
+            <a:lvl7pPr marL="2971800" indent="-228600" algn="r" defTabSz="457200" rtl="1" eaLnBrk="1" latinLnBrk="0" hangingPunct="1">
+              <a:spcBef>
+                <a:spcPts val="1000"/>
+              </a:spcBef>
+              <a:spcAft>
+                <a:spcPts val="0"/>
+              </a:spcAft>
+              <a:buClr>
+                <a:schemeClr val="accent1"/>
+              </a:buClr>
+              <a:buSzPct val="80000"/>
+              <a:buFont typeface="Wingdings 3" charset="2"/>
+              <a:buChar char=""/>
+              <a:defRPr sz="1400" b="0" i="0" kern="1200">
+                <a:solidFill>
+                  <a:schemeClr val="tx1"/>
+                </a:solidFill>
+                <a:latin typeface="+mj-lt"/>
+                <a:ea typeface="+mj-ea"/>
+                <a:cs typeface="+mj-cs"/>
+              </a:defRPr>
+            </a:lvl7pPr>
+            <a:lvl8pPr marL="3429000" indent="-228600" algn="r" defTabSz="457200" rtl="1" eaLnBrk="1" latinLnBrk="0" hangingPunct="1">
+              <a:spcBef>
+                <a:spcPts val="1000"/>
+              </a:spcBef>
+              <a:spcAft>
+                <a:spcPts val="0"/>
+              </a:spcAft>
+              <a:buClr>
+                <a:schemeClr val="accent1"/>
+              </a:buClr>
+              <a:buSzPct val="80000"/>
+              <a:buFont typeface="Wingdings 3" charset="2"/>
+              <a:buChar char=""/>
+              <a:defRPr sz="1400" b="0" i="0" kern="1200">
+                <a:solidFill>
+                  <a:schemeClr val="tx1"/>
+                </a:solidFill>
+                <a:latin typeface="+mj-lt"/>
+                <a:ea typeface="+mj-ea"/>
+                <a:cs typeface="+mj-cs"/>
+              </a:defRPr>
+            </a:lvl8pPr>
+            <a:lvl9pPr marL="3886200" indent="-228600" algn="r" defTabSz="457200" rtl="1" eaLnBrk="1" latinLnBrk="0" hangingPunct="1">
+              <a:spcBef>
+                <a:spcPts val="1000"/>
+              </a:spcBef>
+              <a:spcAft>
+                <a:spcPts val="0"/>
+              </a:spcAft>
+              <a:buClr>
+                <a:schemeClr val="accent1"/>
+              </a:buClr>
+              <a:buSzPct val="80000"/>
+              <a:buFont typeface="Wingdings 3" charset="2"/>
+              <a:buChar char=""/>
+              <a:defRPr sz="1400" b="0" i="0" kern="1200">
+                <a:solidFill>
+                  <a:schemeClr val="tx1"/>
+                </a:solidFill>
+                <a:latin typeface="+mj-lt"/>
+                <a:ea typeface="+mj-ea"/>
+                <a:cs typeface="+mj-cs"/>
+              </a:defRPr>
+            </a:lvl9pPr>
+          </a:lstStyle>
+          <a:p>
+            <a:pPr algn="l" rtl="0">
+              <a:buFont typeface="Wingdings" panose="05000000000000000000" pitchFamily="2" charset="2"/>
+              <a:buChar char="§"/>
+            </a:pPr>
+            <a:r>
+              <a:rPr lang="en-US" sz="2800" dirty="0"/>
+              <a:t>Description: A splash screen is a graphical control element consisting of a window containing an image, a logo, and the current version of the software. A splash screen usually appears while a game or program is launching.</a:t>
+            </a:r>
+          </a:p>
+          <a:p>
+            <a:pPr algn="l" rtl="0">
+              <a:buFont typeface="Wingdings" panose="05000000000000000000" pitchFamily="2" charset="2"/>
+              <a:buChar char="§"/>
+            </a:pPr>
+            <a:r>
+              <a:rPr lang="en-US" sz="2800" dirty="0"/>
+              <a:t>Splash screens are typically used by applications to notify the user that the program is in the process of loading.</a:t>
+            </a:r>
+          </a:p>
+          <a:p>
+            <a:pPr algn="l" rtl="0"/>
+            <a:endParaRPr lang="en-US" sz="2800" dirty="0"/>
+          </a:p>
+          <a:p>
+            <a:pPr marL="0" indent="0" algn="ctr" rtl="0">
+              <a:buNone/>
+            </a:pPr>
+            <a:r>
+              <a:rPr lang="en-US" sz="2800" dirty="0"/>
+              <a:t>	Estimated development time: 6 hours</a:t>
+            </a:r>
+          </a:p>
+          <a:p>
+            <a:pPr marL="0" indent="0" algn="ctr" rtl="0">
+              <a:buNone/>
+            </a:pPr>
+            <a:r>
+              <a:rPr lang="en-US" sz="2800" dirty="0"/>
+              <a:t>Teammate responsible: Gal</a:t>
+            </a:r>
+          </a:p>
+        </p:txBody>
+      </p:sp>
+      <p:pic>
+        <p:nvPicPr>
+          <p:cNvPr id="9" name="Picture 8">
+            <a:extLst>
+              <a:ext uri="{FF2B5EF4-FFF2-40B4-BE49-F238E27FC236}">
+                <a16:creationId xmlns:a16="http://schemas.microsoft.com/office/drawing/2014/main" id="{8BE33804-3AE0-46D3-AB2A-364A360E863B}"/>
+              </a:ext>
+            </a:extLst>
+          </p:cNvPr>
+          <p:cNvPicPr>
+            <a:picLocks noChangeAspect="1"/>
+          </p:cNvPicPr>
+          <p:nvPr/>
+        </p:nvPicPr>
+        <p:blipFill>
+          <a:blip r:embed="rId4"/>
+          <a:stretch>
+            <a:fillRect/>
+          </a:stretch>
+        </p:blipFill>
+        <p:spPr>
+          <a:xfrm>
+            <a:off x="3238866" y="5523238"/>
+            <a:ext cx="325148" cy="325148"/>
+          </a:xfrm>
+          <a:prstGeom prst="rect">
+            <a:avLst/>
+          </a:prstGeom>
+        </p:spPr>
+      </p:pic>
+      <p:pic>
+        <p:nvPicPr>
+          <p:cNvPr id="7" name="Picture 6">
+            <a:extLst>
+              <a:ext uri="{FF2B5EF4-FFF2-40B4-BE49-F238E27FC236}">
+                <a16:creationId xmlns:a16="http://schemas.microsoft.com/office/drawing/2014/main" id="{883983DA-C258-4A51-8C09-B9A09098A1C1}"/>
               </a:ext>
             </a:extLst>
           </p:cNvPr>
@@ -15199,15 +15621,12 @@
         </p:blipFill>
         <p:spPr>
           <a:xfrm>
-            <a:off x="5955384" y="3570319"/>
-            <a:ext cx="1727312" cy="1727312"/>
+            <a:off x="2909301" y="5328561"/>
+            <a:ext cx="6588000" cy="19764"/>
           </a:xfrm>
           <a:prstGeom prst="rect">
             <a:avLst/>
           </a:prstGeom>
-          <a:effectLst>
-            <a:reflection blurRad="6350" stA="52000" endA="300" endPos="35000" dir="5400000" sy="-100000" algn="bl" rotWithShape="0"/>
-          </a:effectLst>
         </p:spPr>
       </p:pic>
       <p:sp>
@@ -15215,7 +15634,7 @@
           <p:cNvPr id="3" name="Slide Number Placeholder 2">
             <a:extLst>
               <a:ext uri="{FF2B5EF4-FFF2-40B4-BE49-F238E27FC236}">
-                <a16:creationId xmlns:a16="http://schemas.microsoft.com/office/drawing/2014/main" id="{51479C1E-00B2-4232-9ACD-187C44A4017B}"/>
+                <a16:creationId xmlns:a16="http://schemas.microsoft.com/office/drawing/2014/main" id="{95AE44FB-6ECA-49C7-B66F-1845B6288425}"/>
               </a:ext>
             </a:extLst>
           </p:cNvPr>
@@ -15241,6 +15660,439 @@
               </a:rPr>
               <a:pPr/>
               <a:t>20</a:t>
+            </a:fld>
+            <a:endParaRPr lang="en-US" dirty="0">
+              <a:solidFill>
+                <a:schemeClr val="bg2">
+                  <a:lumMod val="50000"/>
+                </a:schemeClr>
+              </a:solidFill>
+            </a:endParaRPr>
+          </a:p>
+        </p:txBody>
+      </p:sp>
+      <p:grpSp>
+        <p:nvGrpSpPr>
+          <p:cNvPr id="13" name="Group 12">
+            <a:extLst>
+              <a:ext uri="{FF2B5EF4-FFF2-40B4-BE49-F238E27FC236}">
+                <a16:creationId xmlns:a16="http://schemas.microsoft.com/office/drawing/2014/main" id="{39003577-2299-45FE-826F-4658E86D3003}"/>
+              </a:ext>
+            </a:extLst>
+          </p:cNvPr>
+          <p:cNvGrpSpPr/>
+          <p:nvPr/>
+        </p:nvGrpSpPr>
+        <p:grpSpPr>
+          <a:xfrm>
+            <a:off x="-1382946" y="5808342"/>
+            <a:ext cx="15891426" cy="2636520"/>
+            <a:chOff x="-1382946" y="5737222"/>
+            <a:chExt cx="15891426" cy="2636520"/>
+          </a:xfrm>
+        </p:grpSpPr>
+        <p:sp>
+          <p:nvSpPr>
+            <p:cNvPr id="14" name="Wave 13">
+              <a:extLst>
+                <a:ext uri="{FF2B5EF4-FFF2-40B4-BE49-F238E27FC236}">
+                  <a16:creationId xmlns:a16="http://schemas.microsoft.com/office/drawing/2014/main" id="{85A63C97-7788-4750-A015-6E9CB0FBDF17}"/>
+                </a:ext>
+              </a:extLst>
+            </p:cNvPr>
+            <p:cNvSpPr/>
+            <p:nvPr/>
+          </p:nvSpPr>
+          <p:spPr>
+            <a:xfrm>
+              <a:off x="-1139105" y="5737222"/>
+              <a:ext cx="13380720" cy="2484120"/>
+            </a:xfrm>
+            <a:prstGeom prst="wave">
+              <a:avLst>
+                <a:gd name="adj1" fmla="val 20000"/>
+                <a:gd name="adj2" fmla="val -228"/>
+              </a:avLst>
+            </a:prstGeom>
+            <a:solidFill>
+              <a:schemeClr val="tx1">
+                <a:alpha val="17000"/>
+              </a:schemeClr>
+            </a:solidFill>
+            <a:ln>
+              <a:noFill/>
+            </a:ln>
+          </p:spPr>
+          <p:style>
+            <a:lnRef idx="2">
+              <a:schemeClr val="accent1">
+                <a:shade val="50000"/>
+              </a:schemeClr>
+            </a:lnRef>
+            <a:fillRef idx="1">
+              <a:schemeClr val="accent1"/>
+            </a:fillRef>
+            <a:effectRef idx="0">
+              <a:schemeClr val="accent1"/>
+            </a:effectRef>
+            <a:fontRef idx="minor">
+              <a:schemeClr val="lt1"/>
+            </a:fontRef>
+          </p:style>
+          <p:txBody>
+            <a:bodyPr rtlCol="1" anchor="ctr"/>
+            <a:lstStyle/>
+            <a:p>
+              <a:pPr algn="ctr"/>
+              <a:endParaRPr lang="he-IL"/>
+            </a:p>
+          </p:txBody>
+        </p:sp>
+        <p:sp>
+          <p:nvSpPr>
+            <p:cNvPr id="15" name="Wave 14">
+              <a:extLst>
+                <a:ext uri="{FF2B5EF4-FFF2-40B4-BE49-F238E27FC236}">
+                  <a16:creationId xmlns:a16="http://schemas.microsoft.com/office/drawing/2014/main" id="{D245DF3B-8A7F-4BB8-85AE-9FB97298EF76}"/>
+                </a:ext>
+              </a:extLst>
+            </p:cNvPr>
+            <p:cNvSpPr/>
+            <p:nvPr/>
+          </p:nvSpPr>
+          <p:spPr>
+            <a:xfrm>
+              <a:off x="-1382946" y="5889622"/>
+              <a:ext cx="15891426" cy="2484120"/>
+            </a:xfrm>
+            <a:prstGeom prst="wave">
+              <a:avLst>
+                <a:gd name="adj1" fmla="val 20000"/>
+                <a:gd name="adj2" fmla="val -228"/>
+              </a:avLst>
+            </a:prstGeom>
+            <a:solidFill>
+              <a:schemeClr val="tx1">
+                <a:alpha val="12000"/>
+              </a:schemeClr>
+            </a:solidFill>
+            <a:ln>
+              <a:noFill/>
+            </a:ln>
+          </p:spPr>
+          <p:style>
+            <a:lnRef idx="2">
+              <a:schemeClr val="accent1">
+                <a:shade val="50000"/>
+              </a:schemeClr>
+            </a:lnRef>
+            <a:fillRef idx="1">
+              <a:schemeClr val="accent1"/>
+            </a:fillRef>
+            <a:effectRef idx="0">
+              <a:schemeClr val="accent1"/>
+            </a:effectRef>
+            <a:fontRef idx="minor">
+              <a:schemeClr val="lt1"/>
+            </a:fontRef>
+          </p:style>
+          <p:txBody>
+            <a:bodyPr rtlCol="1" anchor="ctr"/>
+            <a:lstStyle/>
+            <a:p>
+              <a:pPr algn="ctr"/>
+              <a:endParaRPr lang="he-IL"/>
+            </a:p>
+          </p:txBody>
+        </p:sp>
+      </p:grpSp>
+      <p:pic>
+        <p:nvPicPr>
+          <p:cNvPr id="10" name="Graphic 9" descr="Users">
+            <a:extLst>
+              <a:ext uri="{FF2B5EF4-FFF2-40B4-BE49-F238E27FC236}">
+                <a16:creationId xmlns:a16="http://schemas.microsoft.com/office/drawing/2014/main" id="{043230B2-D84B-4A4F-8918-10A7BD16FED6}"/>
+              </a:ext>
+            </a:extLst>
+          </p:cNvPr>
+          <p:cNvPicPr>
+            <a:picLocks noChangeAspect="1"/>
+          </p:cNvPicPr>
+          <p:nvPr/>
+        </p:nvPicPr>
+        <p:blipFill>
+          <a:blip r:embed="rId5">
+            <a:extLst>
+              <a:ext uri="{96DAC541-7B7A-43D3-8B79-37D633B846F1}">
+                <asvg:svgBlip xmlns:asvg="http://schemas.microsoft.com/office/drawing/2016/SVG/main" r:embed="rId6"/>
+              </a:ext>
+            </a:extLst>
+          </a:blip>
+          <a:stretch>
+            <a:fillRect/>
+          </a:stretch>
+        </p:blipFill>
+        <p:spPr>
+          <a:xfrm>
+            <a:off x="3249040" y="5903555"/>
+            <a:ext cx="629948" cy="629948"/>
+          </a:xfrm>
+          <a:prstGeom prst="rect">
+            <a:avLst/>
+          </a:prstGeom>
+        </p:spPr>
+      </p:pic>
+      <p:sp>
+        <p:nvSpPr>
+          <p:cNvPr id="16" name="TextBox 15">
+            <a:extLst>
+              <a:ext uri="{FF2B5EF4-FFF2-40B4-BE49-F238E27FC236}">
+                <a16:creationId xmlns:a16="http://schemas.microsoft.com/office/drawing/2014/main" id="{FC1D612A-D9D0-4E04-B15D-C02789FDB3BD}"/>
+              </a:ext>
+            </a:extLst>
+          </p:cNvPr>
+          <p:cNvSpPr txBox="1"/>
+          <p:nvPr/>
+        </p:nvSpPr>
+        <p:spPr>
+          <a:xfrm>
+            <a:off x="10680509" y="6377605"/>
+            <a:ext cx="1290769" cy="369332"/>
+          </a:xfrm>
+          <a:prstGeom prst="rect">
+            <a:avLst/>
+          </a:prstGeom>
+          <a:noFill/>
+        </p:spPr>
+        <p:txBody>
+          <a:bodyPr wrap="square" rtlCol="1">
+            <a:spAutoFit/>
+          </a:bodyPr>
+          <a:lstStyle/>
+          <a:p>
+            <a:r>
+              <a:rPr lang="en-US" dirty="0"/>
+              <a:t>Difficulty:</a:t>
+            </a:r>
+            <a:endParaRPr lang="he-IL" dirty="0"/>
+          </a:p>
+        </p:txBody>
+      </p:sp>
+      <p:sp>
+        <p:nvSpPr>
+          <p:cNvPr id="18" name="Cylinder 17">
+            <a:extLst>
+              <a:ext uri="{FF2B5EF4-FFF2-40B4-BE49-F238E27FC236}">
+                <a16:creationId xmlns:a16="http://schemas.microsoft.com/office/drawing/2014/main" id="{ADFB6E93-8B67-466F-A79E-E0583EC553F0}"/>
+              </a:ext>
+            </a:extLst>
+          </p:cNvPr>
+          <p:cNvSpPr/>
+          <p:nvPr/>
+        </p:nvSpPr>
+        <p:spPr>
+          <a:xfrm>
+            <a:off x="11730896" y="6364072"/>
+            <a:ext cx="298180" cy="369332"/>
+          </a:xfrm>
+          <a:prstGeom prst="can">
+            <a:avLst>
+              <a:gd name="adj" fmla="val 48252"/>
+            </a:avLst>
+          </a:prstGeom>
+          <a:gradFill flip="none" rotWithShape="1">
+            <a:gsLst>
+              <a:gs pos="0">
+                <a:srgbClr val="FFC000">
+                  <a:shade val="30000"/>
+                  <a:satMod val="115000"/>
+                </a:srgbClr>
+              </a:gs>
+              <a:gs pos="50000">
+                <a:srgbClr val="FFC000">
+                  <a:shade val="67500"/>
+                  <a:satMod val="115000"/>
+                </a:srgbClr>
+              </a:gs>
+              <a:gs pos="100000">
+                <a:srgbClr val="FFC000">
+                  <a:shade val="100000"/>
+                  <a:satMod val="115000"/>
+                </a:srgbClr>
+              </a:gs>
+            </a:gsLst>
+            <a:lin ang="16200000" scaled="1"/>
+            <a:tileRect/>
+          </a:gradFill>
+          <a:ln>
+            <a:noFill/>
+          </a:ln>
+        </p:spPr>
+        <p:style>
+          <a:lnRef idx="2">
+            <a:schemeClr val="accent1">
+              <a:shade val="50000"/>
+            </a:schemeClr>
+          </a:lnRef>
+          <a:fillRef idx="1">
+            <a:schemeClr val="accent1"/>
+          </a:fillRef>
+          <a:effectRef idx="0">
+            <a:schemeClr val="accent1"/>
+          </a:effectRef>
+          <a:fontRef idx="minor">
+            <a:schemeClr val="lt1"/>
+          </a:fontRef>
+        </p:style>
+        <p:txBody>
+          <a:bodyPr rtlCol="1" anchor="ctr"/>
+          <a:lstStyle/>
+          <a:p>
+            <a:pPr algn="ctr"/>
+            <a:endParaRPr lang="he-IL"/>
+          </a:p>
+        </p:txBody>
+      </p:sp>
+    </p:spTree>
+    <p:extLst>
+      <p:ext uri="{BB962C8B-B14F-4D97-AF65-F5344CB8AC3E}">
+        <p14:creationId xmlns:p14="http://schemas.microsoft.com/office/powerpoint/2010/main" val="3537731887"/>
+      </p:ext>
+    </p:extLst>
+  </p:cSld>
+  <p:clrMapOvr>
+    <a:masterClrMapping/>
+  </p:clrMapOvr>
+  <mc:AlternateContent xmlns:mc="http://schemas.openxmlformats.org/markup-compatibility/2006" xmlns:p159="http://schemas.microsoft.com/office/powerpoint/2015/09/main">
+    <mc:Choice Requires="p159">
+      <p:transition spd="slow">
+        <p159:morph option="byObject"/>
+      </p:transition>
+    </mc:Choice>
+    <mc:Fallback xmlns="">
+      <p:transition spd="slow">
+        <p:fade/>
+      </p:transition>
+    </mc:Fallback>
+  </mc:AlternateContent>
+</p:sld>
+</file>
+
+<file path=ppt/slides/slide21.xml><?xml version="1.0" encoding="utf-8"?>
+<p:sld xmlns:a="http://schemas.openxmlformats.org/drawingml/2006/main" xmlns:r="http://schemas.openxmlformats.org/officeDocument/2006/relationships" xmlns:p="http://schemas.openxmlformats.org/presentationml/2006/main">
+  <p:cSld>
+    <p:spTree>
+      <p:nvGrpSpPr>
+        <p:cNvPr id="1" name=""/>
+        <p:cNvGrpSpPr/>
+        <p:nvPr/>
+      </p:nvGrpSpPr>
+      <p:grpSpPr>
+        <a:xfrm>
+          <a:off x="0" y="0"/>
+          <a:ext cx="0" cy="0"/>
+          <a:chOff x="0" y="0"/>
+          <a:chExt cx="0" cy="0"/>
+        </a:xfrm>
+      </p:grpSpPr>
+      <p:sp>
+        <p:nvSpPr>
+          <p:cNvPr id="2" name="Title 1">
+            <a:extLst>
+              <a:ext uri="{FF2B5EF4-FFF2-40B4-BE49-F238E27FC236}">
+                <a16:creationId xmlns:a16="http://schemas.microsoft.com/office/drawing/2014/main" id="{2F7BDECF-398A-9B40-AC85-66605B9B4232}"/>
+              </a:ext>
+            </a:extLst>
+          </p:cNvPr>
+          <p:cNvSpPr>
+            <a:spLocks noGrp="1"/>
+          </p:cNvSpPr>
+          <p:nvPr>
+            <p:ph type="title"/>
+          </p:nvPr>
+        </p:nvSpPr>
+        <p:spPr>
+          <a:xfrm>
+            <a:off x="1683171" y="234912"/>
+            <a:ext cx="8825657" cy="1915647"/>
+          </a:xfrm>
+        </p:spPr>
+        <p:txBody>
+          <a:bodyPr anchor="ctr"/>
+          <a:lstStyle/>
+          <a:p>
+            <a:pPr algn="ctr"/>
+            <a:r>
+              <a:rPr lang="en-US" sz="6000" dirty="0"/>
+              <a:t>Nice to have</a:t>
+            </a:r>
+          </a:p>
+        </p:txBody>
+      </p:sp>
+      <p:pic>
+        <p:nvPicPr>
+          <p:cNvPr id="7" name="Picture 6">
+            <a:extLst>
+              <a:ext uri="{FF2B5EF4-FFF2-40B4-BE49-F238E27FC236}">
+                <a16:creationId xmlns:a16="http://schemas.microsoft.com/office/drawing/2014/main" id="{E54E1617-0D24-45F4-90EC-DA0C41FA5DD2}"/>
+              </a:ext>
+            </a:extLst>
+          </p:cNvPr>
+          <p:cNvPicPr>
+            <a:picLocks noChangeAspect="1"/>
+          </p:cNvPicPr>
+          <p:nvPr/>
+        </p:nvPicPr>
+        <p:blipFill>
+          <a:blip r:embed="rId2"/>
+          <a:stretch>
+            <a:fillRect/>
+          </a:stretch>
+        </p:blipFill>
+        <p:spPr>
+          <a:xfrm>
+            <a:off x="4563463" y="2302959"/>
+            <a:ext cx="2885553" cy="2885553"/>
+          </a:xfrm>
+          <a:prstGeom prst="rect">
+            <a:avLst/>
+          </a:prstGeom>
+          <a:effectLst>
+            <a:reflection blurRad="6350" stA="52000" endA="300" endPos="35000" dir="5400000" sy="-100000" algn="bl" rotWithShape="0"/>
+          </a:effectLst>
+        </p:spPr>
+      </p:pic>
+      <p:sp>
+        <p:nvSpPr>
+          <p:cNvPr id="3" name="Slide Number Placeholder 2">
+            <a:extLst>
+              <a:ext uri="{FF2B5EF4-FFF2-40B4-BE49-F238E27FC236}">
+                <a16:creationId xmlns:a16="http://schemas.microsoft.com/office/drawing/2014/main" id="{51479C1E-00B2-4232-9ACD-187C44A4017B}"/>
+              </a:ext>
+            </a:extLst>
+          </p:cNvPr>
+          <p:cNvSpPr>
+            <a:spLocks noGrp="1"/>
+          </p:cNvSpPr>
+          <p:nvPr>
+            <p:ph type="sldNum" sz="quarter" idx="12"/>
+          </p:nvPr>
+        </p:nvSpPr>
+        <p:spPr/>
+        <p:txBody>
+          <a:bodyPr vert="horz" lIns="91440" tIns="45720" rIns="91440" bIns="45720" rtlCol="0" anchor="b"/>
+          <a:lstStyle/>
+          <a:p>
+            <a:fld id="{6D22F896-40B5-4ADD-8801-0D06FADFA095}" type="slidenum">
+              <a:rPr lang="en-US" smtClean="0">
+                <a:solidFill>
+                  <a:schemeClr val="bg2">
+                    <a:lumMod val="50000"/>
+                  </a:schemeClr>
+                </a:solidFill>
+              </a:rPr>
+              <a:pPr/>
+              <a:t>21</a:t>
             </a:fld>
             <a:endParaRPr lang="en-US" dirty="0">
               <a:solidFill>
@@ -15412,7 +16264,7 @@
 </p:sld>
 </file>
 
-<file path=ppt/slides/slide21.xml><?xml version="1.0" encoding="utf-8"?>
+<file path=ppt/slides/slide22.xml><?xml version="1.0" encoding="utf-8"?>
 <p:sld xmlns:a="http://schemas.openxmlformats.org/drawingml/2006/main" xmlns:r="http://schemas.openxmlformats.org/officeDocument/2006/relationships" xmlns:p="http://schemas.openxmlformats.org/presentationml/2006/main">
   <p:cSld>
     <p:spTree>
@@ -15886,7 +16738,7 @@
                 </a:solidFill>
               </a:rPr>
               <a:pPr/>
-              <a:t>21</a:t>
+              <a:t>22</a:t>
             </a:fld>
             <a:endParaRPr lang="en-US" dirty="0">
               <a:solidFill>
@@ -16205,7 +17057,7 @@
 </p:sld>
 </file>
 
-<file path=ppt/slides/slide22.xml><?xml version="1.0" encoding="utf-8"?>
+<file path=ppt/slides/slide23.xml><?xml version="1.0" encoding="utf-8"?>
 <p:sld xmlns:a="http://schemas.openxmlformats.org/drawingml/2006/main" xmlns:r="http://schemas.openxmlformats.org/officeDocument/2006/relationships" xmlns:p="http://schemas.openxmlformats.org/presentationml/2006/main">
   <p:cSld>
     <p:spTree>
@@ -16552,7 +17404,7 @@
             </a:pPr>
             <a:r>
               <a:rPr lang="en-US" sz="2800" dirty="0"/>
-              <a:t>Description: A splash screen is a graphical control element consisting of a window containing an image, a logo, and the current version of the software. A splash screen usually appears while a game or program is launching.</a:t>
+              <a:t>Provides an easy and convenient way to be added into an existing group. The Employees will receive a SMS with a link. Upon clicking on it, they will automatically be added to the group. </a:t>
             </a:r>
           </a:p>
           <a:p>
@@ -16562,20 +17414,28 @@
             </a:pPr>
             <a:r>
               <a:rPr lang="en-US" sz="2800" dirty="0"/>
-              <a:t>Splash screens are typically used by applications to notify the user that the program is in the process of loading.</a:t>
+              <a:t>Framework involved:</a:t>
             </a:r>
           </a:p>
           <a:p>
-            <a:pPr algn="l" rtl="0"/>
+            <a:pPr marL="0" indent="0" algn="l" rtl="0">
+              <a:buNone/>
+            </a:pPr>
             <a:endParaRPr lang="en-US" sz="2800" dirty="0"/>
           </a:p>
           <a:p>
-            <a:pPr marL="0" indent="0" algn="ctr" rtl="0">
+            <a:pPr marL="0" indent="0" algn="l" rtl="0">
+              <a:buNone/>
+            </a:pPr>
+            <a:endParaRPr lang="en-US" sz="2800" dirty="0"/>
+          </a:p>
+          <a:p>
+            <a:pPr marL="0" indent="0" algn="l" rtl="0">
               <a:buNone/>
             </a:pPr>
             <a:r>
               <a:rPr lang="en-US" sz="2800" dirty="0"/>
-              <a:t>	Estimated development time: 2 hours</a:t>
+              <a:t>                       	Estimated development time: 2 hours</a:t>
             </a:r>
           </a:p>
           <a:p>
@@ -16611,7 +17471,7 @@
         </p:blipFill>
         <p:spPr>
           <a:xfrm>
-            <a:off x="3238866" y="5523238"/>
+            <a:off x="3040458" y="5229948"/>
             <a:ext cx="325148" cy="325148"/>
           </a:xfrm>
           <a:prstGeom prst="rect">
@@ -16641,7 +17501,7 @@
         </p:blipFill>
         <p:spPr>
           <a:xfrm>
-            <a:off x="2909301" y="5328561"/>
+            <a:off x="2909301" y="5043891"/>
             <a:ext cx="6588000" cy="19764"/>
           </a:xfrm>
           <a:prstGeom prst="rect">
@@ -16679,7 +17539,7 @@
                 </a:solidFill>
               </a:rPr>
               <a:pPr/>
-              <a:t>22</a:t>
+              <a:t>23</a:t>
             </a:fld>
             <a:endParaRPr lang="en-US" dirty="0">
               <a:solidFill>
@@ -16854,7 +17714,7 @@
         </p:blipFill>
         <p:spPr>
           <a:xfrm>
-            <a:off x="3249040" y="5903555"/>
+            <a:off x="3309424" y="5636143"/>
             <a:ext cx="629948" cy="629948"/>
           </a:xfrm>
           <a:prstGeom prst="rect">
@@ -16973,6 +17833,36 @@
           </a:p>
         </p:txBody>
       </p:sp>
+      <p:pic>
+        <p:nvPicPr>
+          <p:cNvPr id="19" name="Picture 18">
+            <a:extLst>
+              <a:ext uri="{FF2B5EF4-FFF2-40B4-BE49-F238E27FC236}">
+                <a16:creationId xmlns:a16="http://schemas.microsoft.com/office/drawing/2014/main" id="{80127136-383F-4CD9-AD72-DC8B5EAB1D9B}"/>
+              </a:ext>
+            </a:extLst>
+          </p:cNvPr>
+          <p:cNvPicPr>
+            <a:picLocks noChangeAspect="1"/>
+          </p:cNvPicPr>
+          <p:nvPr/>
+        </p:nvPicPr>
+        <p:blipFill>
+          <a:blip r:embed="rId7"/>
+          <a:stretch>
+            <a:fillRect/>
+          </a:stretch>
+        </p:blipFill>
+        <p:spPr>
+          <a:xfrm>
+            <a:off x="4462006" y="3294317"/>
+            <a:ext cx="1855405" cy="856341"/>
+          </a:xfrm>
+          <a:prstGeom prst="rect">
+            <a:avLst/>
+          </a:prstGeom>
+        </p:spPr>
+      </p:pic>
     </p:spTree>
     <p:extLst>
       <p:ext uri="{BB962C8B-B14F-4D97-AF65-F5344CB8AC3E}">
@@ -16998,7 +17888,7 @@
 </p:sld>
 </file>
 
-<file path=ppt/slides/slide23.xml><?xml version="1.0" encoding="utf-8"?>
+<file path=ppt/slides/slide24.xml><?xml version="1.0" encoding="utf-8"?>
 <p:sld xmlns:a="http://schemas.openxmlformats.org/drawingml/2006/main" xmlns:r="http://schemas.openxmlformats.org/officeDocument/2006/relationships" xmlns:p="http://schemas.openxmlformats.org/presentationml/2006/main">
   <p:cSld>
     <p:spTree>
@@ -17345,7 +18235,7 @@
             </a:pPr>
             <a:r>
               <a:rPr lang="en-US" sz="2800" dirty="0"/>
-              <a:t>Description: A splash screen is a graphical control element consisting of a window containing an image, a logo, and the current version of the software. A splash screen usually appears while a game or program is launching.</a:t>
+              <a:t>Provides the Employer the ability to publish messages to all the other Employees in app.</a:t>
             </a:r>
           </a:p>
           <a:p>
@@ -17353,10 +18243,21 @@
               <a:buFont typeface="Wingdings" panose="05000000000000000000" pitchFamily="2" charset="2"/>
               <a:buChar char="§"/>
             </a:pPr>
-            <a:r>
-              <a:rPr lang="en-US" sz="2800" dirty="0"/>
-              <a:t>Splash screens are typically used by applications to notify the user that the program is in the process of loading.</a:t>
-            </a:r>
+            <a:endParaRPr lang="en-US" sz="2800" dirty="0"/>
+          </a:p>
+          <a:p>
+            <a:pPr algn="l" rtl="0">
+              <a:buFont typeface="Wingdings" panose="05000000000000000000" pitchFamily="2" charset="2"/>
+              <a:buChar char="§"/>
+            </a:pPr>
+            <a:endParaRPr lang="en-US" sz="2800" dirty="0"/>
+          </a:p>
+          <a:p>
+            <a:pPr algn="l" rtl="0">
+              <a:buFont typeface="Wingdings" panose="05000000000000000000" pitchFamily="2" charset="2"/>
+              <a:buChar char="§"/>
+            </a:pPr>
+            <a:endParaRPr lang="en-US" sz="2800" dirty="0"/>
           </a:p>
           <a:p>
             <a:pPr algn="l" rtl="0"/>
@@ -17409,7 +18310,7 @@
         </p:blipFill>
         <p:spPr>
           <a:xfrm>
-            <a:off x="3238866" y="5523238"/>
+            <a:off x="3238866" y="5359338"/>
             <a:ext cx="325148" cy="325148"/>
           </a:xfrm>
           <a:prstGeom prst="rect">
@@ -17439,7 +18340,7 @@
         </p:blipFill>
         <p:spPr>
           <a:xfrm>
-            <a:off x="2909301" y="5328561"/>
+            <a:off x="2909301" y="5164661"/>
             <a:ext cx="6588000" cy="19764"/>
           </a:xfrm>
           <a:prstGeom prst="rect">
@@ -17477,7 +18378,7 @@
                 </a:solidFill>
               </a:rPr>
               <a:pPr/>
-              <a:t>23</a:t>
+              <a:t>24</a:t>
             </a:fld>
             <a:endParaRPr lang="en-US" dirty="0">
               <a:solidFill>
@@ -17652,7 +18553,7 @@
         </p:blipFill>
         <p:spPr>
           <a:xfrm>
-            <a:off x="3249040" y="5903555"/>
+            <a:off x="3249040" y="5782788"/>
             <a:ext cx="629948" cy="629948"/>
           </a:xfrm>
           <a:prstGeom prst="rect">
@@ -17831,9 +18732,10 @@
         </p:nvSpPr>
         <p:spPr>
           <a:xfrm>
-            <a:off x="1393825" y="4277359"/>
+            <a:off x="1276159" y="456582"/>
             <a:ext cx="9404350" cy="1400175"/>
           </a:xfrm>
+          <a:effectLst/>
         </p:spPr>
         <p:txBody>
           <a:bodyPr/>
@@ -17841,29 +18743,22 @@
           <a:p>
             <a:pPr algn="ctr"/>
             <a:r>
-              <a:rPr lang="en-US" sz="6000" dirty="0">
+              <a:rPr lang="en-US" dirty="0">
                 <a:solidFill>
                   <a:schemeClr val="tx1"/>
                 </a:solidFill>
-                <a:effectLst>
-                  <a:outerShdw blurRad="63500" sx="102000" sy="102000" algn="ctr" rotWithShape="0">
-                    <a:prstClr val="black">
-                      <a:alpha val="40000"/>
-                    </a:prstClr>
-                  </a:outerShdw>
-                </a:effectLst>
               </a:rPr>
-              <a:t>Product Backlog</a:t>
+              <a:t>Introduction</a:t>
             </a:r>
           </a:p>
         </p:txBody>
       </p:sp>
       <p:pic>
         <p:nvPicPr>
-          <p:cNvPr id="4" name="Picture 3">
+          <p:cNvPr id="12" name="Picture 11">
             <a:extLst>
               <a:ext uri="{FF2B5EF4-FFF2-40B4-BE49-F238E27FC236}">
-                <a16:creationId xmlns:a16="http://schemas.microsoft.com/office/drawing/2014/main" id="{91E5A672-F6F7-404D-BF61-ABB6D9AF82C7}"/>
+                <a16:creationId xmlns:a16="http://schemas.microsoft.com/office/drawing/2014/main" id="{36CDCE59-5203-4EF5-87F8-330A07C6E6B7}"/>
               </a:ext>
             </a:extLst>
           </p:cNvPr>
@@ -17880,15 +18775,42 @@
         </p:blipFill>
         <p:spPr>
           <a:xfrm>
-            <a:off x="4837189" y="1148595"/>
-            <a:ext cx="2864091" cy="2864091"/>
+            <a:off x="3687622" y="344578"/>
+            <a:ext cx="759183" cy="759183"/>
           </a:xfrm>
           <a:prstGeom prst="rect">
             <a:avLst/>
           </a:prstGeom>
-          <a:effectLst>
-            <a:reflection blurRad="6350" stA="15000" endPos="35000" dir="5400000" sy="-100000" algn="bl" rotWithShape="0"/>
-          </a:effectLst>
+        </p:spPr>
+      </p:pic>
+      <p:pic>
+        <p:nvPicPr>
+          <p:cNvPr id="5" name="Picture 4">
+            <a:extLst>
+              <a:ext uri="{FF2B5EF4-FFF2-40B4-BE49-F238E27FC236}">
+                <a16:creationId xmlns:a16="http://schemas.microsoft.com/office/drawing/2014/main" id="{8B52C801-8561-4876-AC20-B62938ACB0D1}"/>
+              </a:ext>
+            </a:extLst>
+          </p:cNvPr>
+          <p:cNvPicPr>
+            <a:picLocks noChangeAspect="1"/>
+          </p:cNvPicPr>
+          <p:nvPr/>
+        </p:nvPicPr>
+        <p:blipFill>
+          <a:blip r:embed="rId3"/>
+          <a:stretch>
+            <a:fillRect/>
+          </a:stretch>
+        </p:blipFill>
+        <p:spPr>
+          <a:xfrm>
+            <a:off x="1938000" y="1233155"/>
+            <a:ext cx="8316000" cy="24948"/>
+          </a:xfrm>
+          <a:prstGeom prst="rect">
+            <a:avLst/>
+          </a:prstGeom>
         </p:spPr>
       </p:pic>
       <p:sp>
@@ -17896,7 +18818,7 @@
           <p:cNvPr id="3" name="Slide Number Placeholder 2">
             <a:extLst>
               <a:ext uri="{FF2B5EF4-FFF2-40B4-BE49-F238E27FC236}">
-                <a16:creationId xmlns:a16="http://schemas.microsoft.com/office/drawing/2014/main" id="{16812F3E-E50F-4CC2-A5C5-959B03858CB5}"/>
+                <a16:creationId xmlns:a16="http://schemas.microsoft.com/office/drawing/2014/main" id="{0B46A298-D10F-4BCD-940E-D39D9A9EBB0D}"/>
               </a:ext>
             </a:extLst>
           </p:cNvPr>
@@ -17909,7 +18831,7 @@
         </p:nvSpPr>
         <p:spPr/>
         <p:txBody>
-          <a:bodyPr vert="horz" lIns="91440" tIns="45720" rIns="91440" bIns="45720" rtlCol="0" anchor="b"/>
+          <a:bodyPr/>
           <a:lstStyle/>
           <a:p>
             <a:fld id="{6D22F896-40B5-4ADD-8801-0D06FADFA095}" type="slidenum">
@@ -17920,7 +18842,6 @@
                   </a:schemeClr>
                 </a:solidFill>
               </a:rPr>
-              <a:pPr/>
               <a:t>3</a:t>
             </a:fld>
             <a:endParaRPr lang="en-US" dirty="0">
@@ -17938,7 +18859,7 @@
           <p:cNvPr id="9" name="Group 8">
             <a:extLst>
               <a:ext uri="{FF2B5EF4-FFF2-40B4-BE49-F238E27FC236}">
-                <a16:creationId xmlns:a16="http://schemas.microsoft.com/office/drawing/2014/main" id="{D1B5859B-3DB7-4F0E-8F83-774458D984BC}"/>
+                <a16:creationId xmlns:a16="http://schemas.microsoft.com/office/drawing/2014/main" id="{D9C97C93-BF98-4B3F-B93B-2D699F2F83F8}"/>
               </a:ext>
             </a:extLst>
           </p:cNvPr>
@@ -17958,7 +18879,7 @@
             <p:cNvPr id="10" name="Wave 9">
               <a:extLst>
                 <a:ext uri="{FF2B5EF4-FFF2-40B4-BE49-F238E27FC236}">
-                  <a16:creationId xmlns:a16="http://schemas.microsoft.com/office/drawing/2014/main" id="{B37C9314-8D12-4D7F-8174-6418BD263812}"/>
+                  <a16:creationId xmlns:a16="http://schemas.microsoft.com/office/drawing/2014/main" id="{1AC59EE5-06EE-4059-9A3B-B45CF03B3428}"/>
                 </a:ext>
               </a:extLst>
             </p:cNvPr>
@@ -18015,7 +18936,7 @@
             <p:cNvPr id="11" name="Wave 10">
               <a:extLst>
                 <a:ext uri="{FF2B5EF4-FFF2-40B4-BE49-F238E27FC236}">
-                  <a16:creationId xmlns:a16="http://schemas.microsoft.com/office/drawing/2014/main" id="{03800D93-C80F-4650-8939-575C60688C71}"/>
+                  <a16:creationId xmlns:a16="http://schemas.microsoft.com/office/drawing/2014/main" id="{D798413A-FA89-4411-BF21-890E33D5954F}"/>
                 </a:ext>
               </a:extLst>
             </p:cNvPr>
@@ -18071,7 +18992,7 @@
     </p:spTree>
     <p:extLst>
       <p:ext uri="{BB962C8B-B14F-4D97-AF65-F5344CB8AC3E}">
-        <p14:creationId xmlns:p14="http://schemas.microsoft.com/office/powerpoint/2010/main" val="177306881"/>
+        <p14:creationId xmlns:p14="http://schemas.microsoft.com/office/powerpoint/2010/main" val="4021927542"/>
       </p:ext>
     </p:extLst>
   </p:cSld>
@@ -18783,7 +19704,7 @@
             </a:pPr>
             <a:r>
               <a:rPr lang="en-US" sz="2800" dirty="0"/>
-              <a:t>Description: A splash screen is a graphical control element consisting of a window containing an image, a logo, and the current version of the software. A splash screen usually appears while a game or program is launching.</a:t>
+              <a:t>The main component which the app is based on.</a:t>
             </a:r>
           </a:p>
           <a:p>
@@ -18793,11 +19714,21 @@
             </a:pPr>
             <a:r>
               <a:rPr lang="en-US" sz="2800" dirty="0"/>
-              <a:t>Splash screens are typically used by applications to notify the user that the program is in the process of loading.</a:t>
+              <a:t>Given Employees options, the algorithm will produce a valid work schedule, thus saving hassle &amp; precious time for the Employer (instead of usual manual shift management).</a:t>
             </a:r>
           </a:p>
           <a:p>
-            <a:pPr algn="l" rtl="0"/>
+            <a:pPr algn="l" rtl="0">
+              <a:buFont typeface="Wingdings" panose="05000000000000000000" pitchFamily="2" charset="2"/>
+              <a:buChar char="§"/>
+            </a:pPr>
+            <a:endParaRPr lang="en-US" sz="2800" dirty="0"/>
+          </a:p>
+          <a:p>
+            <a:pPr algn="l" rtl="0">
+              <a:buFont typeface="Wingdings" panose="05000000000000000000" pitchFamily="2" charset="2"/>
+              <a:buChar char="§"/>
+            </a:pPr>
             <a:endParaRPr lang="en-US" sz="2800" dirty="0"/>
           </a:p>
           <a:p>
@@ -18847,7 +19778,7 @@
         </p:blipFill>
         <p:spPr>
           <a:xfrm>
-            <a:off x="3143977" y="5523238"/>
+            <a:off x="3126725" y="5221320"/>
             <a:ext cx="325148" cy="325148"/>
           </a:xfrm>
           <a:prstGeom prst="rect">
@@ -18877,7 +19808,7 @@
         </p:blipFill>
         <p:spPr>
           <a:xfrm>
-            <a:off x="2909301" y="5328561"/>
+            <a:off x="2909301" y="5061143"/>
             <a:ext cx="6588000" cy="19764"/>
           </a:xfrm>
           <a:prstGeom prst="rect">
@@ -19090,7 +20021,7 @@
         </p:blipFill>
         <p:spPr>
           <a:xfrm>
-            <a:off x="3249040" y="5903555"/>
+            <a:off x="3249040" y="5644767"/>
             <a:ext cx="629948" cy="629948"/>
           </a:xfrm>
           <a:prstGeom prst="rect">
@@ -20200,7 +21131,7 @@
         </p:blipFill>
         <p:spPr>
           <a:xfrm>
-            <a:off x="1228085" y="525514"/>
+            <a:off x="1209613" y="525514"/>
             <a:ext cx="560886" cy="560886"/>
           </a:xfrm>
           <a:prstGeom prst="rect">
@@ -20440,7 +21371,7 @@
             </a:pPr>
             <a:r>
               <a:rPr lang="en-US" sz="2800" dirty="0"/>
-              <a:t>Description: A splash screen is a graphical control element consisting of a window containing an image, a logo, and the current version of the software. A splash screen usually appears while a game or program is launching.</a:t>
+              <a:t>Every employee has the ability to choose his preferred working hours. </a:t>
             </a:r>
           </a:p>
           <a:p>
@@ -20450,11 +21381,27 @@
             </a:pPr>
             <a:r>
               <a:rPr lang="en-US" sz="2800" dirty="0"/>
-              <a:t>Splash screens are typically used by applications to notify the user that the program is in the process of loading.</a:t>
+              <a:t>The algorithm will take into consideration everyone’s options. </a:t>
             </a:r>
           </a:p>
           <a:p>
-            <a:pPr algn="l" rtl="0"/>
+            <a:pPr algn="l" rtl="0">
+              <a:buFont typeface="Wingdings" panose="05000000000000000000" pitchFamily="2" charset="2"/>
+              <a:buChar char="§"/>
+            </a:pPr>
+            <a:endParaRPr lang="en-US" sz="2800" dirty="0"/>
+          </a:p>
+          <a:p>
+            <a:pPr algn="l" rtl="0">
+              <a:buFont typeface="Wingdings" panose="05000000000000000000" pitchFamily="2" charset="2"/>
+              <a:buChar char="§"/>
+            </a:pPr>
+            <a:endParaRPr lang="en-US" sz="2800" dirty="0"/>
+          </a:p>
+          <a:p>
+            <a:pPr marL="0" indent="0" algn="l" rtl="0">
+              <a:buNone/>
+            </a:pPr>
             <a:endParaRPr lang="en-US" sz="2800" dirty="0"/>
           </a:p>
           <a:p>
@@ -20499,7 +21446,7 @@
         </p:blipFill>
         <p:spPr>
           <a:xfrm>
-            <a:off x="3238866" y="5523238"/>
+            <a:off x="3187110" y="5367969"/>
             <a:ext cx="325148" cy="325148"/>
           </a:xfrm>
           <a:prstGeom prst="rect">
@@ -20529,7 +21476,7 @@
         </p:blipFill>
         <p:spPr>
           <a:xfrm>
-            <a:off x="2909301" y="5328561"/>
+            <a:off x="2909301" y="5190540"/>
             <a:ext cx="6588000" cy="19764"/>
           </a:xfrm>
           <a:prstGeom prst="rect">
@@ -20742,7 +21689,7 @@
         </p:blipFill>
         <p:spPr>
           <a:xfrm>
-            <a:off x="3249040" y="5903555"/>
+            <a:off x="3249040" y="5765535"/>
             <a:ext cx="629948" cy="629948"/>
           </a:xfrm>
           <a:prstGeom prst="rect">
@@ -20936,7 +21883,19 @@
                   <a:schemeClr val="tx1"/>
                 </a:solidFill>
               </a:rPr>
-              <a:t>View of existing schedule (Employee)</a:t>
+              <a:t>View of weekly schedule (U</a:t>
+            </a:r>
+            <a:r>
+              <a:rPr lang="en-US" sz="4400" dirty="0"/>
+              <a:t>ser</a:t>
+            </a:r>
+            <a:r>
+              <a:rPr lang="en-US" dirty="0">
+                <a:solidFill>
+                  <a:schemeClr val="tx1"/>
+                </a:solidFill>
+              </a:rPr>
+              <a:t>)</a:t>
             </a:r>
           </a:p>
         </p:txBody>
@@ -20965,36 +21924,6 @@
           <a:xfrm>
             <a:off x="1938000" y="1233155"/>
             <a:ext cx="8316000" cy="24948"/>
-          </a:xfrm>
-          <a:prstGeom prst="rect">
-            <a:avLst/>
-          </a:prstGeom>
-        </p:spPr>
-      </p:pic>
-      <p:pic>
-        <p:nvPicPr>
-          <p:cNvPr id="4" name="Picture 3">
-            <a:extLst>
-              <a:ext uri="{FF2B5EF4-FFF2-40B4-BE49-F238E27FC236}">
-                <a16:creationId xmlns:a16="http://schemas.microsoft.com/office/drawing/2014/main" id="{1EB5E8E0-C4CE-4ADE-9B30-6B23709B949F}"/>
-              </a:ext>
-            </a:extLst>
-          </p:cNvPr>
-          <p:cNvPicPr>
-            <a:picLocks noChangeAspect="1"/>
-          </p:cNvPicPr>
-          <p:nvPr/>
-        </p:nvPicPr>
-        <p:blipFill>
-          <a:blip r:embed="rId3"/>
-          <a:stretch>
-            <a:fillRect/>
-          </a:stretch>
-        </p:blipFill>
-        <p:spPr>
-          <a:xfrm>
-            <a:off x="1210827" y="525514"/>
-            <a:ext cx="560886" cy="560886"/>
           </a:xfrm>
           <a:prstGeom prst="rect">
             <a:avLst/>
@@ -21228,26 +22157,38 @@
           </a:lstStyle>
           <a:p>
             <a:pPr algn="l" rtl="0">
-              <a:buFont typeface="Wingdings" panose="05000000000000000000" pitchFamily="2" charset="2"/>
-              <a:buChar char="§"/>
+              <a:buFont typeface="Arial" panose="020B0604020202020204" pitchFamily="34" charset="0"/>
+              <a:buChar char="•"/>
             </a:pPr>
             <a:r>
               <a:rPr lang="en-US" sz="2800" dirty="0"/>
-              <a:t>Description: A splash screen is a graphical control element consisting of a window containing an image, a logo, and the current version of the software. A splash screen usually appears while a game or program is launching.</a:t>
+              <a:t>After a schedule has been made, every User would be able to view the weekly schedule (of all other members as well).</a:t>
             </a:r>
           </a:p>
           <a:p>
+            <a:pPr marL="0" indent="0" algn="l" rtl="0">
+              <a:buNone/>
+            </a:pPr>
+            <a:endParaRPr lang="en-US" sz="2800" dirty="0"/>
+          </a:p>
+          <a:p>
             <a:pPr algn="l" rtl="0">
-              <a:buFont typeface="Wingdings" panose="05000000000000000000" pitchFamily="2" charset="2"/>
-              <a:buChar char="§"/>
+              <a:buFont typeface="Arial" panose="020B0604020202020204" pitchFamily="34" charset="0"/>
+              <a:buChar char="•"/>
             </a:pPr>
-            <a:r>
-              <a:rPr lang="en-US" sz="2800" dirty="0"/>
-              <a:t>Splash screens are typically used by applications to notify the user that the program is in the process of loading.</a:t>
-            </a:r>
-          </a:p>
-          <a:p>
-            <a:pPr algn="l" rtl="0"/>
+            <a:endParaRPr lang="en-US" sz="2800" dirty="0"/>
+          </a:p>
+          <a:p>
+            <a:pPr marL="0" indent="0" algn="l" rtl="0">
+              <a:buNone/>
+            </a:pPr>
+            <a:endParaRPr lang="en-US" sz="2800" dirty="0"/>
+          </a:p>
+          <a:p>
+            <a:pPr algn="l" rtl="0">
+              <a:buFont typeface="Arial" panose="020B0604020202020204" pitchFamily="34" charset="0"/>
+              <a:buChar char="•"/>
+            </a:pPr>
             <a:endParaRPr lang="en-US" sz="2800" dirty="0"/>
           </a:p>
           <a:p>
@@ -21285,14 +22226,14 @@
           <p:nvPr/>
         </p:nvPicPr>
         <p:blipFill>
-          <a:blip r:embed="rId4"/>
+          <a:blip r:embed="rId3"/>
           <a:stretch>
             <a:fillRect/>
           </a:stretch>
         </p:blipFill>
         <p:spPr>
           <a:xfrm>
-            <a:off x="3238866" y="5523238"/>
+            <a:off x="3187109" y="5333461"/>
             <a:ext cx="325148" cy="325148"/>
           </a:xfrm>
           <a:prstGeom prst="rect">
@@ -21322,7 +22263,7 @@
         </p:blipFill>
         <p:spPr>
           <a:xfrm>
-            <a:off x="2909301" y="5328561"/>
+            <a:off x="2909301" y="5190540"/>
             <a:ext cx="6588000" cy="19764"/>
           </a:xfrm>
           <a:prstGeom prst="rect">
@@ -21522,10 +22463,10 @@
           <p:nvPr/>
         </p:nvPicPr>
         <p:blipFill>
-          <a:blip r:embed="rId5">
+          <a:blip r:embed="rId4">
             <a:extLst>
               <a:ext uri="{96DAC541-7B7A-43D3-8B79-37D633B846F1}">
-                <asvg:svgBlip xmlns:asvg="http://schemas.microsoft.com/office/drawing/2016/SVG/main" r:embed="rId6"/>
+                <asvg:svgBlip xmlns:asvg="http://schemas.microsoft.com/office/drawing/2016/SVG/main" r:embed="rId5"/>
               </a:ext>
             </a:extLst>
           </a:blip>
@@ -21535,7 +22476,7 @@
         </p:blipFill>
         <p:spPr>
           <a:xfrm>
-            <a:off x="3249040" y="5903555"/>
+            <a:off x="3197283" y="5713778"/>
             <a:ext cx="629948" cy="629948"/>
           </a:xfrm>
           <a:prstGeom prst="rect">
@@ -21654,6 +22595,36 @@
           </a:p>
         </p:txBody>
       </p:sp>
+      <p:pic>
+        <p:nvPicPr>
+          <p:cNvPr id="17" name="Picture 16">
+            <a:extLst>
+              <a:ext uri="{FF2B5EF4-FFF2-40B4-BE49-F238E27FC236}">
+                <a16:creationId xmlns:a16="http://schemas.microsoft.com/office/drawing/2014/main" id="{E3A20AA4-2AAF-4C61-9D46-9C3F6DA5AFD8}"/>
+              </a:ext>
+            </a:extLst>
+          </p:cNvPr>
+          <p:cNvPicPr>
+            <a:picLocks noChangeAspect="1"/>
+          </p:cNvPicPr>
+          <p:nvPr/>
+        </p:nvPicPr>
+        <p:blipFill>
+          <a:blip r:embed="rId6"/>
+          <a:stretch>
+            <a:fillRect/>
+          </a:stretch>
+        </p:blipFill>
+        <p:spPr>
+          <a:xfrm>
+            <a:off x="1892549" y="531524"/>
+            <a:ext cx="560886" cy="560886"/>
+          </a:xfrm>
+          <a:prstGeom prst="rect">
+            <a:avLst/>
+          </a:prstGeom>
+        </p:spPr>
+      </p:pic>
     </p:spTree>
     <p:extLst>
       <p:ext uri="{BB962C8B-B14F-4D97-AF65-F5344CB8AC3E}">

</xml_diff>

<commit_message>
Upload revised version of the presentation
</commit_message>
<xml_diff>
--- a/Backlog.pptx
+++ b/Backlog.pptx
@@ -220,7 +220,7 @@
           <a:p>
             <a:fld id="{19BA28D3-546A-4B77-84A4-31AB33EEC16B}" type="datetimeFigureOut">
               <a:rPr lang="he-IL" smtClean="0"/>
-              <a:t>י"א/כסלו/תשע"ט</a:t>
+              <a:t>י"א.כסלו.תשע"ט</a:t>
             </a:fld>
             <a:endParaRPr lang="he-IL"/>
           </a:p>
@@ -645,7 +645,7 @@
           <a:p>
             <a:fld id="{792AAFAA-7B78-43EF-9E3E-042257DFB35B}" type="datetime1">
               <a:rPr lang="en-US" smtClean="0"/>
-              <a:t>11/19/2018</a:t>
+              <a:t>11/19/18</a:t>
             </a:fld>
             <a:endParaRPr lang="en-US" dirty="0"/>
           </a:p>
@@ -945,7 +945,7 @@
           <a:p>
             <a:fld id="{4FFF340C-6B71-4FA1-ADED-3889D4EFE6E9}" type="datetime1">
               <a:rPr lang="en-US" smtClean="0"/>
-              <a:t>11/19/2018</a:t>
+              <a:t>11/19/18</a:t>
             </a:fld>
             <a:endParaRPr lang="en-US" dirty="0"/>
           </a:p>
@@ -1152,7 +1152,7 @@
           <a:p>
             <a:fld id="{3132C541-71AF-4A8E-8CC1-1BC11259679C}" type="datetime1">
               <a:rPr lang="en-US" smtClean="0"/>
-              <a:t>11/19/2018</a:t>
+              <a:t>11/19/18</a:t>
             </a:fld>
             <a:endParaRPr lang="en-US" dirty="0"/>
           </a:p>
@@ -1433,7 +1433,7 @@
           <a:p>
             <a:fld id="{79E3794A-F0C0-4AFD-90C4-76BCEF52E835}" type="datetime1">
               <a:rPr lang="en-US" smtClean="0"/>
-              <a:t>11/19/2018</a:t>
+              <a:t>11/19/18</a:t>
             </a:fld>
             <a:endParaRPr lang="en-US" dirty="0"/>
           </a:p>
@@ -1778,7 +1778,7 @@
           <a:p>
             <a:fld id="{890EE26B-BB39-45D3-A150-7A22CBAEA2DC}" type="datetime1">
               <a:rPr lang="en-US" smtClean="0"/>
-              <a:t>11/19/2018</a:t>
+              <a:t>11/19/18</a:t>
             </a:fld>
             <a:endParaRPr lang="en-US" dirty="0"/>
           </a:p>
@@ -2401,7 +2401,7 @@
           <a:p>
             <a:fld id="{7C7B9E8F-0BB3-41B5-A60B-014F046C67C4}" type="datetime1">
               <a:rPr lang="en-US" smtClean="0"/>
-              <a:t>11/19/2018</a:t>
+              <a:t>11/19/18</a:t>
             </a:fld>
             <a:endParaRPr lang="en-US" dirty="0"/>
           </a:p>
@@ -3261,7 +3261,7 @@
           <a:p>
             <a:fld id="{F9021199-CDD1-440A-B974-4A18C49EF84B}" type="datetime1">
               <a:rPr lang="en-US" smtClean="0"/>
-              <a:t>11/19/2018</a:t>
+              <a:t>11/19/18</a:t>
             </a:fld>
             <a:endParaRPr lang="en-US" dirty="0"/>
           </a:p>
@@ -3444,7 +3444,7 @@
           <a:p>
             <a:fld id="{4F5EEA7D-CE3D-4A8B-B5D9-6CA4AB43A3C9}" type="datetime1">
               <a:rPr lang="en-US" smtClean="0"/>
-              <a:t>11/19/2018</a:t>
+              <a:t>11/19/18</a:t>
             </a:fld>
             <a:endParaRPr lang="en-US" dirty="0"/>
           </a:p>
@@ -3636,7 +3636,7 @@
           <a:p>
             <a:fld id="{A5F17F34-BC0C-4552-871A-120DCF537639}" type="datetime1">
               <a:rPr lang="en-US" smtClean="0"/>
-              <a:t>11/19/2018</a:t>
+              <a:t>11/19/18</a:t>
             </a:fld>
             <a:endParaRPr lang="en-US" dirty="0"/>
           </a:p>
@@ -3818,7 +3818,7 @@
           <a:p>
             <a:fld id="{5FF9D923-C86B-4863-AD77-34FC78976372}" type="datetime1">
               <a:rPr lang="en-US" smtClean="0"/>
-              <a:t>11/19/2018</a:t>
+              <a:t>11/19/18</a:t>
             </a:fld>
             <a:endParaRPr lang="en-US" dirty="0"/>
           </a:p>
@@ -4074,7 +4074,7 @@
           <a:p>
             <a:fld id="{EA382D88-AE59-4CBE-BB26-17F91E555001}" type="datetime1">
               <a:rPr lang="en-US" smtClean="0"/>
-              <a:t>11/19/2018</a:t>
+              <a:t>11/19/18</a:t>
             </a:fld>
             <a:endParaRPr lang="en-US" dirty="0"/>
           </a:p>
@@ -4378,7 +4378,7 @@
           <a:p>
             <a:fld id="{0BF04825-F3AD-4AE8-A979-DB441EDDC1E4}" type="datetime1">
               <a:rPr lang="en-US" smtClean="0"/>
-              <a:t>11/19/2018</a:t>
+              <a:t>11/19/18</a:t>
             </a:fld>
             <a:endParaRPr lang="en-US" dirty="0"/>
           </a:p>
@@ -4828,7 +4828,7 @@
           <a:p>
             <a:fld id="{7E812CBE-DBD8-4CCE-A480-5C35A5626084}" type="datetime1">
               <a:rPr lang="en-US" smtClean="0"/>
-              <a:t>11/19/2018</a:t>
+              <a:t>11/19/18</a:t>
             </a:fld>
             <a:endParaRPr lang="en-US" dirty="0"/>
           </a:p>
@@ -4958,7 +4958,7 @@
           <a:p>
             <a:fld id="{C7FBD888-97E8-4FAA-B4A2-126A00CB9898}" type="datetime1">
               <a:rPr lang="en-US" smtClean="0"/>
-              <a:t>11/19/2018</a:t>
+              <a:t>11/19/18</a:t>
             </a:fld>
             <a:endParaRPr lang="en-US" dirty="0"/>
           </a:p>
@@ -5065,7 +5065,7 @@
           <a:p>
             <a:fld id="{3BF117DC-E28F-4010-9A6D-C643EF6D6817}" type="datetime1">
               <a:rPr lang="en-US" smtClean="0"/>
-              <a:t>11/19/2018</a:t>
+              <a:t>11/19/18</a:t>
             </a:fld>
             <a:endParaRPr lang="en-US" dirty="0"/>
           </a:p>
@@ -5356,7 +5356,7 @@
           <a:p>
             <a:fld id="{2A80FA70-EF47-455B-A14D-85546722D335}" type="datetime1">
               <a:rPr lang="en-US" smtClean="0"/>
-              <a:t>11/19/2018</a:t>
+              <a:t>11/19/18</a:t>
             </a:fld>
             <a:endParaRPr lang="en-US" dirty="0"/>
           </a:p>
@@ -5643,7 +5643,7 @@
           <a:p>
             <a:fld id="{E0B80E97-60F2-4293-9B79-A4178ED1CAC2}" type="datetime1">
               <a:rPr lang="en-US" smtClean="0"/>
-              <a:t>11/19/2018</a:t>
+              <a:t>11/19/18</a:t>
             </a:fld>
             <a:endParaRPr lang="en-US" dirty="0"/>
           </a:p>
@@ -6084,7 +6084,7 @@
           <a:p>
             <a:fld id="{1B002E81-550A-42DF-8C9B-257CC61FBBA3}" type="datetime1">
               <a:rPr lang="en-US" smtClean="0"/>
-              <a:t>11/19/2018</a:t>
+              <a:t>11/19/18</a:t>
             </a:fld>
             <a:endParaRPr lang="en-US" dirty="0"/>
           </a:p>
@@ -9088,7 +9088,7 @@
             </a:pPr>
             <a:r>
               <a:rPr lang="en-US" sz="2800" dirty="0"/>
-              <a:t>Description: A splash screen is a graphical control element consisting of a window containing an image, a logo, and the current version of the software. A splash screen usually appears while a game or program is launching.</a:t>
+              <a:t>The employer can create a new group and invite the employees to be a part of it. The group consists of name, time slots for shifts etc.</a:t>
             </a:r>
           </a:p>
           <a:p>
@@ -9098,8 +9098,17 @@
             </a:pPr>
             <a:r>
               <a:rPr lang="en-US" sz="2800" dirty="0"/>
-              <a:t>Splash screens are typically used by applications to notify the user that the program is in the process of loading.</a:t>
+              <a:t>Each workplace/division in a workplace can have its own group on </a:t>
             </a:r>
+            <a:r>
+              <a:rPr lang="en-US" sz="2800" dirty="0" err="1"/>
+              <a:t>Shiftly</a:t>
+            </a:r>
+            <a:endParaRPr lang="en-US" sz="2800" dirty="0"/>
+          </a:p>
+          <a:p>
+            <a:pPr algn="l" rtl="0"/>
+            <a:endParaRPr lang="en-US" sz="2800" dirty="0"/>
           </a:p>
           <a:p>
             <a:pPr algn="l" rtl="0"/>
@@ -9147,7 +9156,7 @@
         </p:blipFill>
         <p:spPr>
           <a:xfrm>
-            <a:off x="3169858" y="5523238"/>
+            <a:off x="3169858" y="5629254"/>
             <a:ext cx="325148" cy="325148"/>
           </a:xfrm>
           <a:prstGeom prst="rect">
@@ -9390,7 +9399,7 @@
         </p:blipFill>
         <p:spPr>
           <a:xfrm>
-            <a:off x="3352555" y="5903555"/>
+            <a:off x="3352555" y="6062579"/>
             <a:ext cx="629948" cy="629948"/>
           </a:xfrm>
           <a:prstGeom prst="rect">
@@ -10307,7 +10316,7 @@
             </a:pPr>
             <a:r>
               <a:rPr lang="en-US" sz="2800" dirty="0"/>
-              <a:t>Description: A splash screen is a graphical control element consisting of a window containing an image, a logo, and the current version of the software. A splash screen usually appears while a game or program is launching.</a:t>
+              <a:t>Once the employees filled out their options of shifts for the upcoming week, the employer can view those options and give her/his feedback</a:t>
             </a:r>
           </a:p>
           <a:p>
@@ -10315,10 +10324,21 @@
               <a:buFont typeface="Wingdings" panose="05000000000000000000" pitchFamily="2" charset="2"/>
               <a:buChar char="§"/>
             </a:pPr>
-            <a:r>
-              <a:rPr lang="en-US" sz="2800" dirty="0"/>
-              <a:t>Splash screens are typically used by applications to notify the user that the program is in the process of loading.</a:t>
-            </a:r>
+            <a:endParaRPr lang="en-US" sz="2800" dirty="0"/>
+          </a:p>
+          <a:p>
+            <a:pPr algn="l" rtl="0">
+              <a:buFont typeface="Wingdings" panose="05000000000000000000" pitchFamily="2" charset="2"/>
+              <a:buChar char="§"/>
+            </a:pPr>
+            <a:endParaRPr lang="en-US" sz="2800" dirty="0"/>
+          </a:p>
+          <a:p>
+            <a:pPr algn="l" rtl="0">
+              <a:buFont typeface="Wingdings" panose="05000000000000000000" pitchFamily="2" charset="2"/>
+              <a:buChar char="§"/>
+            </a:pPr>
+            <a:endParaRPr lang="en-US" sz="2800" dirty="0"/>
           </a:p>
           <a:p>
             <a:pPr algn="l" rtl="0"/>
@@ -10366,7 +10386,7 @@
         </p:blipFill>
         <p:spPr>
           <a:xfrm>
-            <a:off x="3238866" y="5523238"/>
+            <a:off x="3238866" y="5788281"/>
             <a:ext cx="325148" cy="325148"/>
           </a:xfrm>
           <a:prstGeom prst="rect">
@@ -10609,7 +10629,7 @@
         </p:blipFill>
         <p:spPr>
           <a:xfrm>
-            <a:off x="3249040" y="5903555"/>
+            <a:off x="3249040" y="6155345"/>
             <a:ext cx="629948" cy="629948"/>
           </a:xfrm>
           <a:prstGeom prst="rect">
@@ -15532,7 +15552,7 @@
             </a:pPr>
             <a:r>
               <a:rPr lang="en-US" sz="2800" dirty="0"/>
-              <a:t>Description: A splash screen is a graphical control element consisting of a window containing an image, a logo, and the current version of the software. A splash screen usually appears while a game or program is launching.</a:t>
+              <a:t>Once all employees filled out their options and the employer confirmed and published the created schedule, both the employees and the employer can export the shift schedule into their own Google calendar accounts</a:t>
             </a:r>
           </a:p>
           <a:p>
@@ -15540,13 +15560,20 @@
               <a:buFont typeface="Wingdings" panose="05000000000000000000" pitchFamily="2" charset="2"/>
               <a:buChar char="§"/>
             </a:pPr>
-            <a:r>
-              <a:rPr lang="en-US" sz="2800" dirty="0"/>
-              <a:t>Splash screens are typically used by applications to notify the user that the program is in the process of loading.</a:t>
-            </a:r>
-          </a:p>
-          <a:p>
-            <a:pPr algn="l" rtl="0"/>
+            <a:endParaRPr lang="en-US" sz="2800" dirty="0"/>
+          </a:p>
+          <a:p>
+            <a:pPr algn="l" rtl="0">
+              <a:buFont typeface="Wingdings" panose="05000000000000000000" pitchFamily="2" charset="2"/>
+              <a:buChar char="§"/>
+            </a:pPr>
+            <a:endParaRPr lang="en-US" sz="2800" dirty="0"/>
+          </a:p>
+          <a:p>
+            <a:pPr algn="l" rtl="0">
+              <a:buFont typeface="Wingdings" panose="05000000000000000000" pitchFamily="2" charset="2"/>
+              <a:buChar char="§"/>
+            </a:pPr>
             <a:endParaRPr lang="en-US" sz="2800" dirty="0"/>
           </a:p>
           <a:p>
@@ -15591,7 +15618,7 @@
         </p:blipFill>
         <p:spPr>
           <a:xfrm>
-            <a:off x="3238866" y="5523238"/>
+            <a:off x="3238866" y="5629254"/>
             <a:ext cx="325148" cy="325148"/>
           </a:xfrm>
           <a:prstGeom prst="rect">
@@ -15834,7 +15861,7 @@
         </p:blipFill>
         <p:spPr>
           <a:xfrm>
-            <a:off x="3249040" y="5903555"/>
+            <a:off x="3249040" y="6062580"/>
             <a:ext cx="629948" cy="629948"/>
           </a:xfrm>
           <a:prstGeom prst="rect">
@@ -16611,7 +16638,7 @@
             </a:pPr>
             <a:r>
               <a:rPr lang="en-US" sz="2800" dirty="0"/>
-              <a:t>Description: A splash screen is a graphical control element consisting of a window containing an image, a logo, and the current version of the software. A splash screen usually appears while a game or program is launching.</a:t>
+              <a:t>Support for the Hebrew language for Hebrew speakers</a:t>
             </a:r>
           </a:p>
           <a:p>
@@ -16619,10 +16646,28 @@
               <a:buFont typeface="Wingdings" panose="05000000000000000000" pitchFamily="2" charset="2"/>
               <a:buChar char="§"/>
             </a:pPr>
-            <a:r>
-              <a:rPr lang="en-US" sz="2800" dirty="0"/>
-              <a:t>Splash screens are typically used by applications to notify the user that the program is in the process of loading.</a:t>
-            </a:r>
+            <a:endParaRPr lang="en-US" sz="2800" dirty="0"/>
+          </a:p>
+          <a:p>
+            <a:pPr algn="l" rtl="0">
+              <a:buFont typeface="Wingdings" panose="05000000000000000000" pitchFamily="2" charset="2"/>
+              <a:buChar char="§"/>
+            </a:pPr>
+            <a:endParaRPr lang="en-US" sz="2800" dirty="0"/>
+          </a:p>
+          <a:p>
+            <a:pPr algn="l" rtl="0">
+              <a:buFont typeface="Wingdings" panose="05000000000000000000" pitchFamily="2" charset="2"/>
+              <a:buChar char="§"/>
+            </a:pPr>
+            <a:endParaRPr lang="en-US" sz="2800" dirty="0"/>
+          </a:p>
+          <a:p>
+            <a:pPr algn="l" rtl="0">
+              <a:buFont typeface="Wingdings" panose="05000000000000000000" pitchFamily="2" charset="2"/>
+              <a:buChar char="§"/>
+            </a:pPr>
+            <a:endParaRPr lang="en-US" sz="2800" dirty="0"/>
           </a:p>
           <a:p>
             <a:pPr algn="l" rtl="0"/>
@@ -20578,7 +20623,7 @@
             </a:pPr>
             <a:r>
               <a:rPr lang="en-US" sz="2800" dirty="0"/>
-              <a:t>Description: A splash screen is a graphical control element consisting of a window containing an image, a logo, and the current version of the software. A splash screen usually appears while a game or program is launching.</a:t>
+              <a:t>The employer has the option of configuring the specific time slots of the shifts for the upcoming week</a:t>
             </a:r>
           </a:p>
           <a:p>
@@ -20588,11 +20633,21 @@
             </a:pPr>
             <a:r>
               <a:rPr lang="en-US" sz="2800" dirty="0"/>
-              <a:t>Splash screens are typically used by applications to notify the user that the program is in the process of loading.</a:t>
+              <a:t>This can be done only by the employer</a:t>
             </a:r>
           </a:p>
           <a:p>
             <a:pPr algn="l" rtl="0"/>
+            <a:endParaRPr lang="en-US" sz="2800" dirty="0"/>
+          </a:p>
+          <a:p>
+            <a:pPr algn="l" rtl="0"/>
+            <a:endParaRPr lang="en-US" sz="2800" dirty="0"/>
+          </a:p>
+          <a:p>
+            <a:pPr marL="0" indent="0" algn="l" rtl="0">
+              <a:buNone/>
+            </a:pPr>
             <a:endParaRPr lang="en-US" sz="2800" dirty="0"/>
           </a:p>
           <a:p>
@@ -20637,7 +20692,7 @@
         </p:blipFill>
         <p:spPr>
           <a:xfrm>
-            <a:off x="3238866" y="5523238"/>
+            <a:off x="3238866" y="5364213"/>
             <a:ext cx="325148" cy="325148"/>
           </a:xfrm>
           <a:prstGeom prst="rect">
@@ -20880,7 +20935,7 @@
         </p:blipFill>
         <p:spPr>
           <a:xfrm>
-            <a:off x="3464701" y="5903555"/>
+            <a:off x="3464701" y="5797539"/>
             <a:ext cx="629948" cy="629948"/>
           </a:xfrm>
           <a:prstGeom prst="rect">
@@ -22997,7 +23052,7 @@
             </a:pPr>
             <a:r>
               <a:rPr lang="en-US" sz="2800" dirty="0"/>
-              <a:t>Description: A splash screen is a graphical control element consisting of a window containing an image, a logo, and the current version of the software. A splash screen usually appears while a game or program is launching.</a:t>
+              <a:t>After the employees filled out their options of the shifts for the upcoming week and the employer viewed the schedule that was created, the employer can confirm and publish the schedule.</a:t>
             </a:r>
           </a:p>
           <a:p>
@@ -23007,8 +23062,15 @@
             </a:pPr>
             <a:r>
               <a:rPr lang="en-US" sz="2800" dirty="0"/>
-              <a:t>Splash screens are typically used by applications to notify the user that the program is in the process of loading.</a:t>
+              <a:t>Once the employer does so, the employees will get a notification that the schedule is final</a:t>
             </a:r>
+          </a:p>
+          <a:p>
+            <a:pPr algn="l" rtl="0">
+              <a:buFont typeface="Wingdings" panose="05000000000000000000" pitchFamily="2" charset="2"/>
+              <a:buChar char="§"/>
+            </a:pPr>
+            <a:endParaRPr lang="en-US" sz="2800" dirty="0"/>
           </a:p>
           <a:p>
             <a:pPr algn="l" rtl="0"/>
@@ -23056,7 +23118,7 @@
         </p:blipFill>
         <p:spPr>
           <a:xfrm>
-            <a:off x="3238866" y="5523238"/>
+            <a:off x="3238866" y="5642506"/>
             <a:ext cx="325148" cy="325148"/>
           </a:xfrm>
           <a:prstGeom prst="rect">
@@ -23299,7 +23361,7 @@
         </p:blipFill>
         <p:spPr>
           <a:xfrm>
-            <a:off x="3352555" y="5903555"/>
+            <a:off x="3352555" y="6022823"/>
             <a:ext cx="629948" cy="629948"/>
           </a:xfrm>
           <a:prstGeom prst="rect">

</xml_diff>